<commit_message>
tried splitting master GBIF species list into separate species files
</commit_message>
<xml_diff>
--- a/CodingWorkflow.pptx
+++ b/CodingWorkflow.pptx
@@ -243,7 +243,7 @@
           <a:p>
             <a:fld id="{9D97B504-67CE-45BE-ADD0-830AC3C59E05}" type="datetimeFigureOut">
               <a:rPr lang="en-US" smtClean="0"/>
-              <a:t>4/12/2021</a:t>
+              <a:t>5/7/2021</a:t>
             </a:fld>
             <a:endParaRPr lang="en-US"/>
           </a:p>
@@ -413,7 +413,7 @@
           <a:p>
             <a:fld id="{9D97B504-67CE-45BE-ADD0-830AC3C59E05}" type="datetimeFigureOut">
               <a:rPr lang="en-US" smtClean="0"/>
-              <a:t>4/12/2021</a:t>
+              <a:t>5/7/2021</a:t>
             </a:fld>
             <a:endParaRPr lang="en-US"/>
           </a:p>
@@ -593,7 +593,7 @@
           <a:p>
             <a:fld id="{9D97B504-67CE-45BE-ADD0-830AC3C59E05}" type="datetimeFigureOut">
               <a:rPr lang="en-US" smtClean="0"/>
-              <a:t>4/12/2021</a:t>
+              <a:t>5/7/2021</a:t>
             </a:fld>
             <a:endParaRPr lang="en-US"/>
           </a:p>
@@ -763,7 +763,7 @@
           <a:p>
             <a:fld id="{9D97B504-67CE-45BE-ADD0-830AC3C59E05}" type="datetimeFigureOut">
               <a:rPr lang="en-US" smtClean="0"/>
-              <a:t>4/12/2021</a:t>
+              <a:t>5/7/2021</a:t>
             </a:fld>
             <a:endParaRPr lang="en-US"/>
           </a:p>
@@ -1007,7 +1007,7 @@
           <a:p>
             <a:fld id="{9D97B504-67CE-45BE-ADD0-830AC3C59E05}" type="datetimeFigureOut">
               <a:rPr lang="en-US" smtClean="0"/>
-              <a:t>4/12/2021</a:t>
+              <a:t>5/7/2021</a:t>
             </a:fld>
             <a:endParaRPr lang="en-US"/>
           </a:p>
@@ -1239,7 +1239,7 @@
           <a:p>
             <a:fld id="{9D97B504-67CE-45BE-ADD0-830AC3C59E05}" type="datetimeFigureOut">
               <a:rPr lang="en-US" smtClean="0"/>
-              <a:t>4/12/2021</a:t>
+              <a:t>5/7/2021</a:t>
             </a:fld>
             <a:endParaRPr lang="en-US"/>
           </a:p>
@@ -1606,7 +1606,7 @@
           <a:p>
             <a:fld id="{9D97B504-67CE-45BE-ADD0-830AC3C59E05}" type="datetimeFigureOut">
               <a:rPr lang="en-US" smtClean="0"/>
-              <a:t>4/12/2021</a:t>
+              <a:t>5/7/2021</a:t>
             </a:fld>
             <a:endParaRPr lang="en-US"/>
           </a:p>
@@ -1724,7 +1724,7 @@
           <a:p>
             <a:fld id="{9D97B504-67CE-45BE-ADD0-830AC3C59E05}" type="datetimeFigureOut">
               <a:rPr lang="en-US" smtClean="0"/>
-              <a:t>4/12/2021</a:t>
+              <a:t>5/7/2021</a:t>
             </a:fld>
             <a:endParaRPr lang="en-US"/>
           </a:p>
@@ -1819,7 +1819,7 @@
           <a:p>
             <a:fld id="{9D97B504-67CE-45BE-ADD0-830AC3C59E05}" type="datetimeFigureOut">
               <a:rPr lang="en-US" smtClean="0"/>
-              <a:t>4/12/2021</a:t>
+              <a:t>5/7/2021</a:t>
             </a:fld>
             <a:endParaRPr lang="en-US"/>
           </a:p>
@@ -2096,7 +2096,7 @@
           <a:p>
             <a:fld id="{9D97B504-67CE-45BE-ADD0-830AC3C59E05}" type="datetimeFigureOut">
               <a:rPr lang="en-US" smtClean="0"/>
-              <a:t>4/12/2021</a:t>
+              <a:t>5/7/2021</a:t>
             </a:fld>
             <a:endParaRPr lang="en-US"/>
           </a:p>
@@ -2353,7 +2353,7 @@
           <a:p>
             <a:fld id="{9D97B504-67CE-45BE-ADD0-830AC3C59E05}" type="datetimeFigureOut">
               <a:rPr lang="en-US" smtClean="0"/>
-              <a:t>4/12/2021</a:t>
+              <a:t>5/7/2021</a:t>
             </a:fld>
             <a:endParaRPr lang="en-US"/>
           </a:p>
@@ -2566,7 +2566,7 @@
           <a:p>
             <a:fld id="{9D97B504-67CE-45BE-ADD0-830AC3C59E05}" type="datetimeFigureOut">
               <a:rPr lang="en-US" smtClean="0"/>
-              <a:t>4/12/2021</a:t>
+              <a:t>5/7/2021</a:t>
             </a:fld>
             <a:endParaRPr lang="en-US"/>
           </a:p>
@@ -3186,7 +3186,7 @@
         <p:spPr>
           <a:xfrm>
             <a:off x="411369" y="4488354"/>
-            <a:ext cx="991563" cy="4820139"/>
+            <a:ext cx="991563" cy="6661719"/>
           </a:xfrm>
           <a:prstGeom prst="rect">
             <a:avLst/>
@@ -3227,10 +3227,10 @@
       </p:sp>
       <p:sp>
         <p:nvSpPr>
-          <p:cNvPr id="293" name="Rectangle 292">
-            <a:extLst>
-              <a:ext uri="{FF2B5EF4-FFF2-40B4-BE49-F238E27FC236}">
-                <a16:creationId xmlns:a16="http://schemas.microsoft.com/office/drawing/2014/main" id="{3E6F34AA-7951-4635-AF68-58C04F42D1D7}"/>
+          <p:cNvPr id="292" name="Rectangle 291">
+            <a:extLst>
+              <a:ext uri="{FF2B5EF4-FFF2-40B4-BE49-F238E27FC236}">
+                <a16:creationId xmlns:a16="http://schemas.microsoft.com/office/drawing/2014/main" id="{E09B13DB-82F1-4879-9EBF-572AF1416E9E}"/>
               </a:ext>
             </a:extLst>
           </p:cNvPr>
@@ -3239,8 +3239,8 @@
         </p:nvSpPr>
         <p:spPr>
           <a:xfrm>
-            <a:off x="9322872" y="9930126"/>
-            <a:ext cx="2504160" cy="2261869"/>
+            <a:off x="5041681" y="11309691"/>
+            <a:ext cx="6728476" cy="882304"/>
           </a:xfrm>
           <a:prstGeom prst="rect">
             <a:avLst/>
@@ -3275,16 +3275,16 @@
           <a:lstStyle/>
           <a:p>
             <a:pPr algn="ctr"/>
-            <a:endParaRPr lang="en-US" dirty="0"/>
-          </a:p>
-        </p:txBody>
-      </p:sp>
-      <p:sp>
-        <p:nvSpPr>
-          <p:cNvPr id="292" name="Rectangle 291">
-            <a:extLst>
-              <a:ext uri="{FF2B5EF4-FFF2-40B4-BE49-F238E27FC236}">
-                <a16:creationId xmlns:a16="http://schemas.microsoft.com/office/drawing/2014/main" id="{E09B13DB-82F1-4879-9EBF-572AF1416E9E}"/>
+            <a:endParaRPr lang="en-US"/>
+          </a:p>
+        </p:txBody>
+      </p:sp>
+      <p:sp>
+        <p:nvSpPr>
+          <p:cNvPr id="291" name="Rectangle 290">
+            <a:extLst>
+              <a:ext uri="{FF2B5EF4-FFF2-40B4-BE49-F238E27FC236}">
+                <a16:creationId xmlns:a16="http://schemas.microsoft.com/office/drawing/2014/main" id="{72028534-B643-4CB1-90BF-7CAC7007463A}"/>
               </a:ext>
             </a:extLst>
           </p:cNvPr>
@@ -3293,8 +3293,8 @@
         </p:nvSpPr>
         <p:spPr>
           <a:xfrm>
-            <a:off x="5041681" y="9930126"/>
-            <a:ext cx="4281191" cy="2261869"/>
+            <a:off x="1395431" y="11326001"/>
+            <a:ext cx="3646250" cy="865993"/>
           </a:xfrm>
           <a:prstGeom prst="rect">
             <a:avLst/>
@@ -3335,10 +3335,10 @@
       </p:sp>
       <p:sp>
         <p:nvSpPr>
-          <p:cNvPr id="291" name="Rectangle 290">
-            <a:extLst>
-              <a:ext uri="{FF2B5EF4-FFF2-40B4-BE49-F238E27FC236}">
-                <a16:creationId xmlns:a16="http://schemas.microsoft.com/office/drawing/2014/main" id="{72028534-B643-4CB1-90BF-7CAC7007463A}"/>
+          <p:cNvPr id="290" name="Rectangle 289">
+            <a:extLst>
+              <a:ext uri="{FF2B5EF4-FFF2-40B4-BE49-F238E27FC236}">
+                <a16:creationId xmlns:a16="http://schemas.microsoft.com/office/drawing/2014/main" id="{DFABD2E5-1E2C-4E12-AF57-3F0F26F6DE42}"/>
               </a:ext>
             </a:extLst>
           </p:cNvPr>
@@ -3347,62 +3347,8 @@
         </p:nvSpPr>
         <p:spPr>
           <a:xfrm>
-            <a:off x="1395431" y="9308493"/>
-            <a:ext cx="3646250" cy="2883502"/>
-          </a:xfrm>
-          <a:prstGeom prst="rect">
-            <a:avLst/>
-          </a:prstGeom>
-          <a:solidFill>
-            <a:srgbClr val="564D80">
-              <a:alpha val="40000"/>
-            </a:srgbClr>
-          </a:solidFill>
-          <a:ln>
-            <a:noFill/>
-          </a:ln>
-        </p:spPr>
-        <p:style>
-          <a:lnRef idx="2">
-            <a:schemeClr val="accent1">
-              <a:shade val="50000"/>
-            </a:schemeClr>
-          </a:lnRef>
-          <a:fillRef idx="1">
-            <a:schemeClr val="accent1"/>
-          </a:fillRef>
-          <a:effectRef idx="0">
-            <a:schemeClr val="accent1"/>
-          </a:effectRef>
-          <a:fontRef idx="minor">
-            <a:schemeClr val="lt1"/>
-          </a:fontRef>
-        </p:style>
-        <p:txBody>
-          <a:bodyPr rtlCol="0" anchor="ctr"/>
-          <a:lstStyle/>
-          <a:p>
-            <a:pPr algn="ctr"/>
-            <a:endParaRPr lang="en-US"/>
-          </a:p>
-        </p:txBody>
-      </p:sp>
-      <p:sp>
-        <p:nvSpPr>
-          <p:cNvPr id="290" name="Rectangle 289">
-            <a:extLst>
-              <a:ext uri="{FF2B5EF4-FFF2-40B4-BE49-F238E27FC236}">
-                <a16:creationId xmlns:a16="http://schemas.microsoft.com/office/drawing/2014/main" id="{DFABD2E5-1E2C-4E12-AF57-3F0F26F6DE42}"/>
-              </a:ext>
-            </a:extLst>
-          </p:cNvPr>
-          <p:cNvSpPr/>
-          <p:nvPr/>
-        </p:nvSpPr>
-        <p:spPr>
-          <a:xfrm>
             <a:off x="1395430" y="4397460"/>
-            <a:ext cx="10431601" cy="4912353"/>
+            <a:ext cx="10431601" cy="6895212"/>
           </a:xfrm>
           <a:prstGeom prst="rect">
             <a:avLst/>
@@ -3443,60 +3389,6 @@
       </p:sp>
       <p:sp>
         <p:nvSpPr>
-          <p:cNvPr id="289" name="Rectangle 288">
-            <a:extLst>
-              <a:ext uri="{FF2B5EF4-FFF2-40B4-BE49-F238E27FC236}">
-                <a16:creationId xmlns:a16="http://schemas.microsoft.com/office/drawing/2014/main" id="{2557F1E3-479C-435C-B521-CCAF19855C7C}"/>
-              </a:ext>
-            </a:extLst>
-          </p:cNvPr>
-          <p:cNvSpPr/>
-          <p:nvPr/>
-        </p:nvSpPr>
-        <p:spPr>
-          <a:xfrm>
-            <a:off x="5033198" y="9308493"/>
-            <a:ext cx="2566829" cy="621633"/>
-          </a:xfrm>
-          <a:prstGeom prst="rect">
-            <a:avLst/>
-          </a:prstGeom>
-          <a:solidFill>
-            <a:srgbClr val="98A6D4">
-              <a:alpha val="60000"/>
-            </a:srgbClr>
-          </a:solidFill>
-          <a:ln>
-            <a:noFill/>
-          </a:ln>
-        </p:spPr>
-        <p:style>
-          <a:lnRef idx="2">
-            <a:schemeClr val="accent1">
-              <a:shade val="50000"/>
-            </a:schemeClr>
-          </a:lnRef>
-          <a:fillRef idx="1">
-            <a:schemeClr val="accent1"/>
-          </a:fillRef>
-          <a:effectRef idx="0">
-            <a:schemeClr val="accent1"/>
-          </a:effectRef>
-          <a:fontRef idx="minor">
-            <a:schemeClr val="lt1"/>
-          </a:fontRef>
-        </p:style>
-        <p:txBody>
-          <a:bodyPr rtlCol="0" anchor="ctr"/>
-          <a:lstStyle/>
-          <a:p>
-            <a:pPr algn="ctr"/>
-            <a:endParaRPr lang="en-US"/>
-          </a:p>
-        </p:txBody>
-      </p:sp>
-      <p:sp>
-        <p:nvSpPr>
           <p:cNvPr id="288" name="Rectangle 287">
             <a:extLst>
               <a:ext uri="{FF2B5EF4-FFF2-40B4-BE49-F238E27FC236}">
@@ -7142,8 +7034,8 @@
         </p:nvSpPr>
         <p:spPr>
           <a:xfrm>
-            <a:off x="3076477" y="11553822"/>
-            <a:ext cx="1987660" cy="507831"/>
+            <a:off x="3128382" y="11553822"/>
+            <a:ext cx="1883849" cy="507831"/>
           </a:xfrm>
           <a:prstGeom prst="rect">
             <a:avLst/>
@@ -7179,7 +7071,7 @@
             <a:pPr algn="ctr"/>
             <a:r>
               <a:rPr lang="en-US" sz="1100" i="1" dirty="0"/>
-              <a:t>12 climate models for each city</a:t>
+              <a:t>6 climate models for each city</a:t>
             </a:r>
             <a:endParaRPr lang="en-US" sz="1600" i="1" dirty="0"/>
           </a:p>
@@ -7815,60 +7707,6 @@
           </a:fontRef>
         </p:style>
       </p:cxnSp>
-      <p:sp>
-        <p:nvSpPr>
-          <p:cNvPr id="294" name="Rectangle 293">
-            <a:extLst>
-              <a:ext uri="{FF2B5EF4-FFF2-40B4-BE49-F238E27FC236}">
-                <a16:creationId xmlns:a16="http://schemas.microsoft.com/office/drawing/2014/main" id="{B1E74657-215D-4B65-A16C-78BA799C71A6}"/>
-              </a:ext>
-            </a:extLst>
-          </p:cNvPr>
-          <p:cNvSpPr/>
-          <p:nvPr/>
-        </p:nvSpPr>
-        <p:spPr>
-          <a:xfrm>
-            <a:off x="7600027" y="9309813"/>
-            <a:ext cx="4219350" cy="620310"/>
-          </a:xfrm>
-          <a:prstGeom prst="rect">
-            <a:avLst/>
-          </a:prstGeom>
-          <a:solidFill>
-            <a:srgbClr val="564D80">
-              <a:alpha val="40000"/>
-            </a:srgbClr>
-          </a:solidFill>
-          <a:ln>
-            <a:noFill/>
-          </a:ln>
-        </p:spPr>
-        <p:style>
-          <a:lnRef idx="2">
-            <a:schemeClr val="accent1">
-              <a:shade val="50000"/>
-            </a:schemeClr>
-          </a:lnRef>
-          <a:fillRef idx="1">
-            <a:schemeClr val="accent1"/>
-          </a:fillRef>
-          <a:effectRef idx="0">
-            <a:schemeClr val="accent1"/>
-          </a:effectRef>
-          <a:fontRef idx="minor">
-            <a:schemeClr val="lt1"/>
-          </a:fontRef>
-        </p:style>
-        <p:txBody>
-          <a:bodyPr rtlCol="0" anchor="ctr"/>
-          <a:lstStyle/>
-          <a:p>
-            <a:pPr algn="ctr"/>
-            <a:endParaRPr lang="en-US"/>
-          </a:p>
-        </p:txBody>
-      </p:sp>
       <p:sp>
         <p:nvSpPr>
           <p:cNvPr id="299" name="TextBox 298">

</xml_diff>

<commit_message>
revised script to work with job submit on compute canada. Created script to bulk download records from GBIF. Begun script to assign IUCN red list status
</commit_message>
<xml_diff>
--- a/CodingWorkflow.pptx
+++ b/CodingWorkflow.pptx
@@ -6,6 +6,7 @@
   </p:sldMasterIdLst>
   <p:sldIdLst>
     <p:sldId id="256" r:id="rId2"/>
+    <p:sldId id="257" r:id="rId3"/>
   </p:sldIdLst>
   <p:sldSz cx="11887200" cy="12192000"/>
   <p:notesSz cx="6858000" cy="9144000"/>
@@ -243,7 +244,7 @@
           <a:p>
             <a:fld id="{9D97B504-67CE-45BE-ADD0-830AC3C59E05}" type="datetimeFigureOut">
               <a:rPr lang="en-US" smtClean="0"/>
-              <a:t>5/7/2021</a:t>
+              <a:t>6/2/2021</a:t>
             </a:fld>
             <a:endParaRPr lang="en-US"/>
           </a:p>
@@ -413,7 +414,7 @@
           <a:p>
             <a:fld id="{9D97B504-67CE-45BE-ADD0-830AC3C59E05}" type="datetimeFigureOut">
               <a:rPr lang="en-US" smtClean="0"/>
-              <a:t>5/7/2021</a:t>
+              <a:t>6/2/2021</a:t>
             </a:fld>
             <a:endParaRPr lang="en-US"/>
           </a:p>
@@ -593,7 +594,7 @@
           <a:p>
             <a:fld id="{9D97B504-67CE-45BE-ADD0-830AC3C59E05}" type="datetimeFigureOut">
               <a:rPr lang="en-US" smtClean="0"/>
-              <a:t>5/7/2021</a:t>
+              <a:t>6/2/2021</a:t>
             </a:fld>
             <a:endParaRPr lang="en-US"/>
           </a:p>
@@ -763,7 +764,7 @@
           <a:p>
             <a:fld id="{9D97B504-67CE-45BE-ADD0-830AC3C59E05}" type="datetimeFigureOut">
               <a:rPr lang="en-US" smtClean="0"/>
-              <a:t>5/7/2021</a:t>
+              <a:t>6/2/2021</a:t>
             </a:fld>
             <a:endParaRPr lang="en-US"/>
           </a:p>
@@ -1007,7 +1008,7 @@
           <a:p>
             <a:fld id="{9D97B504-67CE-45BE-ADD0-830AC3C59E05}" type="datetimeFigureOut">
               <a:rPr lang="en-US" smtClean="0"/>
-              <a:t>5/7/2021</a:t>
+              <a:t>6/2/2021</a:t>
             </a:fld>
             <a:endParaRPr lang="en-US"/>
           </a:p>
@@ -1239,7 +1240,7 @@
           <a:p>
             <a:fld id="{9D97B504-67CE-45BE-ADD0-830AC3C59E05}" type="datetimeFigureOut">
               <a:rPr lang="en-US" smtClean="0"/>
-              <a:t>5/7/2021</a:t>
+              <a:t>6/2/2021</a:t>
             </a:fld>
             <a:endParaRPr lang="en-US"/>
           </a:p>
@@ -1606,7 +1607,7 @@
           <a:p>
             <a:fld id="{9D97B504-67CE-45BE-ADD0-830AC3C59E05}" type="datetimeFigureOut">
               <a:rPr lang="en-US" smtClean="0"/>
-              <a:t>5/7/2021</a:t>
+              <a:t>6/2/2021</a:t>
             </a:fld>
             <a:endParaRPr lang="en-US"/>
           </a:p>
@@ -1724,7 +1725,7 @@
           <a:p>
             <a:fld id="{9D97B504-67CE-45BE-ADD0-830AC3C59E05}" type="datetimeFigureOut">
               <a:rPr lang="en-US" smtClean="0"/>
-              <a:t>5/7/2021</a:t>
+              <a:t>6/2/2021</a:t>
             </a:fld>
             <a:endParaRPr lang="en-US"/>
           </a:p>
@@ -1819,7 +1820,7 @@
           <a:p>
             <a:fld id="{9D97B504-67CE-45BE-ADD0-830AC3C59E05}" type="datetimeFigureOut">
               <a:rPr lang="en-US" smtClean="0"/>
-              <a:t>5/7/2021</a:t>
+              <a:t>6/2/2021</a:t>
             </a:fld>
             <a:endParaRPr lang="en-US"/>
           </a:p>
@@ -2096,7 +2097,7 @@
           <a:p>
             <a:fld id="{9D97B504-67CE-45BE-ADD0-830AC3C59E05}" type="datetimeFigureOut">
               <a:rPr lang="en-US" smtClean="0"/>
-              <a:t>5/7/2021</a:t>
+              <a:t>6/2/2021</a:t>
             </a:fld>
             <a:endParaRPr lang="en-US"/>
           </a:p>
@@ -2353,7 +2354,7 @@
           <a:p>
             <a:fld id="{9D97B504-67CE-45BE-ADD0-830AC3C59E05}" type="datetimeFigureOut">
               <a:rPr lang="en-US" smtClean="0"/>
-              <a:t>5/7/2021</a:t>
+              <a:t>6/2/2021</a:t>
             </a:fld>
             <a:endParaRPr lang="en-US"/>
           </a:p>
@@ -2566,7 +2567,7 @@
           <a:p>
             <a:fld id="{9D97B504-67CE-45BE-ADD0-830AC3C59E05}" type="datetimeFigureOut">
               <a:rPr lang="en-US" smtClean="0"/>
-              <a:t>5/7/2021</a:t>
+              <a:t>6/2/2021</a:t>
             </a:fld>
             <a:endParaRPr lang="en-US"/>
           </a:p>
@@ -6654,13 +6655,8 @@
             <a:pPr algn="ctr"/>
             <a:r>
               <a:rPr lang="en-US" sz="1100" i="1" dirty="0"/>
-              <a:t>Lowest </a:t>
-            </a:r>
-            <a:r>
-              <a:rPr lang="en-US" sz="1100" i="1" dirty="0" err="1"/>
-              <a:t>AICc</a:t>
-            </a:r>
-            <a:endParaRPr lang="en-US" sz="1100" i="1" dirty="0"/>
+              <a:t>Lowest AICc</a:t>
+            </a:r>
           </a:p>
         </p:txBody>
       </p:sp>
@@ -6707,10 +6703,9 @@
           <a:p>
             <a:pPr algn="ctr"/>
             <a:r>
-              <a:rPr lang="en-US" sz="1600" dirty="0" err="1"/>
+              <a:rPr lang="en-US" sz="1600" dirty="0"/>
               <a:t>MaxEnt</a:t>
             </a:r>
-            <a:endParaRPr lang="en-US" sz="1600" dirty="0"/>
           </a:p>
         </p:txBody>
       </p:sp>
@@ -7749,6 +7744,4126 @@
     <p:extLst>
       <p:ext uri="{BB962C8B-B14F-4D97-AF65-F5344CB8AC3E}">
         <p14:creationId xmlns:p14="http://schemas.microsoft.com/office/powerpoint/2010/main" val="1007078339"/>
+      </p:ext>
+    </p:extLst>
+  </p:cSld>
+  <p:clrMapOvr>
+    <a:masterClrMapping/>
+  </p:clrMapOvr>
+</p:sld>
+</file>
+
+<file path=ppt/slides/slide2.xml><?xml version="1.0" encoding="utf-8"?>
+<p:sld xmlns:a="http://schemas.openxmlformats.org/drawingml/2006/main" xmlns:r="http://schemas.openxmlformats.org/officeDocument/2006/relationships" xmlns:p="http://schemas.openxmlformats.org/presentationml/2006/main">
+  <p:cSld>
+    <p:spTree>
+      <p:nvGrpSpPr>
+        <p:cNvPr id="1" name=""/>
+        <p:cNvGrpSpPr/>
+        <p:nvPr/>
+      </p:nvGrpSpPr>
+      <p:grpSpPr>
+        <a:xfrm>
+          <a:off x="0" y="0"/>
+          <a:ext cx="0" cy="0"/>
+          <a:chOff x="0" y="0"/>
+          <a:chExt cx="0" cy="0"/>
+        </a:xfrm>
+      </p:grpSpPr>
+      <p:cxnSp>
+        <p:nvCxnSpPr>
+          <p:cNvPr id="168" name="Straight Connector 167">
+            <a:extLst>
+              <a:ext uri="{FF2B5EF4-FFF2-40B4-BE49-F238E27FC236}">
+                <a16:creationId xmlns:a16="http://schemas.microsoft.com/office/drawing/2014/main" id="{7932BF29-B45D-44AE-B01D-CB83BC73E751}"/>
+              </a:ext>
+            </a:extLst>
+          </p:cNvPr>
+          <p:cNvCxnSpPr>
+            <a:cxnSpLocks/>
+            <a:endCxn id="167" idx="1"/>
+          </p:cNvCxnSpPr>
+          <p:nvPr/>
+        </p:nvCxnSpPr>
+        <p:spPr>
+          <a:xfrm>
+            <a:off x="6052523" y="5702510"/>
+            <a:ext cx="2711471" cy="6623"/>
+          </a:xfrm>
+          <a:prstGeom prst="line">
+            <a:avLst/>
+          </a:prstGeom>
+          <a:ln w="12700"/>
+        </p:spPr>
+        <p:style>
+          <a:lnRef idx="1">
+            <a:schemeClr val="accent1"/>
+          </a:lnRef>
+          <a:fillRef idx="0">
+            <a:schemeClr val="accent1"/>
+          </a:fillRef>
+          <a:effectRef idx="0">
+            <a:schemeClr val="accent1"/>
+          </a:effectRef>
+          <a:fontRef idx="minor">
+            <a:schemeClr val="tx1"/>
+          </a:fontRef>
+        </p:style>
+      </p:cxnSp>
+      <p:cxnSp>
+        <p:nvCxnSpPr>
+          <p:cNvPr id="270" name="Straight Connector 269">
+            <a:extLst>
+              <a:ext uri="{FF2B5EF4-FFF2-40B4-BE49-F238E27FC236}">
+                <a16:creationId xmlns:a16="http://schemas.microsoft.com/office/drawing/2014/main" id="{561A7C1C-D2F2-4CC1-9BD4-F87C729A661B}"/>
+              </a:ext>
+            </a:extLst>
+          </p:cNvPr>
+          <p:cNvCxnSpPr>
+            <a:cxnSpLocks/>
+          </p:cNvCxnSpPr>
+          <p:nvPr/>
+        </p:nvCxnSpPr>
+        <p:spPr>
+          <a:xfrm>
+            <a:off x="7316345" y="9657207"/>
+            <a:ext cx="357433" cy="0"/>
+          </a:xfrm>
+          <a:prstGeom prst="line">
+            <a:avLst/>
+          </a:prstGeom>
+          <a:ln w="12700"/>
+        </p:spPr>
+        <p:style>
+          <a:lnRef idx="1">
+            <a:schemeClr val="accent1"/>
+          </a:lnRef>
+          <a:fillRef idx="0">
+            <a:schemeClr val="accent1"/>
+          </a:fillRef>
+          <a:effectRef idx="0">
+            <a:schemeClr val="accent1"/>
+          </a:effectRef>
+          <a:fontRef idx="minor">
+            <a:schemeClr val="tx1"/>
+          </a:fontRef>
+        </p:style>
+      </p:cxnSp>
+      <p:cxnSp>
+        <p:nvCxnSpPr>
+          <p:cNvPr id="216" name="Straight Connector 215">
+            <a:extLst>
+              <a:ext uri="{FF2B5EF4-FFF2-40B4-BE49-F238E27FC236}">
+                <a16:creationId xmlns:a16="http://schemas.microsoft.com/office/drawing/2014/main" id="{FF752487-DE32-46D7-9698-5E2476FE771C}"/>
+              </a:ext>
+            </a:extLst>
+          </p:cNvPr>
+          <p:cNvCxnSpPr>
+            <a:cxnSpLocks/>
+          </p:cNvCxnSpPr>
+          <p:nvPr/>
+        </p:nvCxnSpPr>
+        <p:spPr>
+          <a:xfrm>
+            <a:off x="7673778" y="7700670"/>
+            <a:ext cx="0" cy="3840480"/>
+          </a:xfrm>
+          <a:prstGeom prst="line">
+            <a:avLst/>
+          </a:prstGeom>
+          <a:ln w="12700"/>
+        </p:spPr>
+        <p:style>
+          <a:lnRef idx="1">
+            <a:schemeClr val="accent1"/>
+          </a:lnRef>
+          <a:fillRef idx="0">
+            <a:schemeClr val="accent1"/>
+          </a:fillRef>
+          <a:effectRef idx="0">
+            <a:schemeClr val="accent1"/>
+          </a:effectRef>
+          <a:fontRef idx="minor">
+            <a:schemeClr val="tx1"/>
+          </a:fontRef>
+        </p:style>
+      </p:cxnSp>
+      <p:cxnSp>
+        <p:nvCxnSpPr>
+          <p:cNvPr id="265" name="Straight Connector 264">
+            <a:extLst>
+              <a:ext uri="{FF2B5EF4-FFF2-40B4-BE49-F238E27FC236}">
+                <a16:creationId xmlns:a16="http://schemas.microsoft.com/office/drawing/2014/main" id="{4D2EF60F-FE4C-4C79-AAE4-F414A92EECED}"/>
+              </a:ext>
+            </a:extLst>
+          </p:cNvPr>
+          <p:cNvCxnSpPr>
+            <a:cxnSpLocks/>
+          </p:cNvCxnSpPr>
+          <p:nvPr/>
+        </p:nvCxnSpPr>
+        <p:spPr>
+          <a:xfrm>
+            <a:off x="4675329" y="7735356"/>
+            <a:ext cx="0" cy="2194936"/>
+          </a:xfrm>
+          <a:prstGeom prst="line">
+            <a:avLst/>
+          </a:prstGeom>
+          <a:ln w="12700"/>
+        </p:spPr>
+        <p:style>
+          <a:lnRef idx="1">
+            <a:schemeClr val="accent1"/>
+          </a:lnRef>
+          <a:fillRef idx="0">
+            <a:schemeClr val="accent1"/>
+          </a:fillRef>
+          <a:effectRef idx="0">
+            <a:schemeClr val="accent1"/>
+          </a:effectRef>
+          <a:fontRef idx="minor">
+            <a:schemeClr val="tx1"/>
+          </a:fontRef>
+        </p:style>
+      </p:cxnSp>
+      <p:cxnSp>
+        <p:nvCxnSpPr>
+          <p:cNvPr id="136" name="Straight Connector 135">
+            <a:extLst>
+              <a:ext uri="{FF2B5EF4-FFF2-40B4-BE49-F238E27FC236}">
+                <a16:creationId xmlns:a16="http://schemas.microsoft.com/office/drawing/2014/main" id="{340B9877-C449-46DE-AEF6-B34B01F47B7A}"/>
+              </a:ext>
+            </a:extLst>
+          </p:cNvPr>
+          <p:cNvCxnSpPr>
+            <a:cxnSpLocks/>
+            <a:stCxn id="103" idx="3"/>
+          </p:cNvCxnSpPr>
+          <p:nvPr/>
+        </p:nvCxnSpPr>
+        <p:spPr>
+          <a:xfrm>
+            <a:off x="6079599" y="1202915"/>
+            <a:ext cx="3181487" cy="0"/>
+          </a:xfrm>
+          <a:prstGeom prst="line">
+            <a:avLst/>
+          </a:prstGeom>
+          <a:ln w="12700"/>
+        </p:spPr>
+        <p:style>
+          <a:lnRef idx="1">
+            <a:schemeClr val="accent1"/>
+          </a:lnRef>
+          <a:fillRef idx="0">
+            <a:schemeClr val="accent1"/>
+          </a:fillRef>
+          <a:effectRef idx="0">
+            <a:schemeClr val="accent1"/>
+          </a:effectRef>
+          <a:fontRef idx="minor">
+            <a:schemeClr val="tx1"/>
+          </a:fontRef>
+        </p:style>
+      </p:cxnSp>
+      <p:sp>
+        <p:nvSpPr>
+          <p:cNvPr id="83" name="TextBox 82">
+            <a:extLst>
+              <a:ext uri="{FF2B5EF4-FFF2-40B4-BE49-F238E27FC236}">
+                <a16:creationId xmlns:a16="http://schemas.microsoft.com/office/drawing/2014/main" id="{650FE680-0F52-4341-835A-E25E457F5172}"/>
+              </a:ext>
+            </a:extLst>
+          </p:cNvPr>
+          <p:cNvSpPr txBox="1"/>
+          <p:nvPr/>
+        </p:nvSpPr>
+        <p:spPr>
+          <a:xfrm>
+            <a:off x="339693" y="4169152"/>
+            <a:ext cx="884216" cy="646331"/>
+          </a:xfrm>
+          <a:prstGeom prst="rect">
+            <a:avLst/>
+          </a:prstGeom>
+          <a:noFill/>
+        </p:spPr>
+        <p:txBody>
+          <a:bodyPr wrap="none" rtlCol="0">
+            <a:spAutoFit/>
+          </a:bodyPr>
+          <a:lstStyle/>
+          <a:p>
+            <a:r>
+              <a:rPr lang="en-US" b="1" dirty="0"/>
+              <a:t>Model</a:t>
+            </a:r>
+          </a:p>
+          <a:p>
+            <a:r>
+              <a:rPr lang="en-US" i="1" dirty="0"/>
+              <a:t>Parallel</a:t>
+            </a:r>
+            <a:endParaRPr lang="en-US" b="1" dirty="0"/>
+          </a:p>
+        </p:txBody>
+      </p:sp>
+      <p:sp>
+        <p:nvSpPr>
+          <p:cNvPr id="84" name="TextBox 83">
+            <a:extLst>
+              <a:ext uri="{FF2B5EF4-FFF2-40B4-BE49-F238E27FC236}">
+                <a16:creationId xmlns:a16="http://schemas.microsoft.com/office/drawing/2014/main" id="{C1E55914-5515-48E6-B59E-8EF22154D6EE}"/>
+              </a:ext>
+            </a:extLst>
+          </p:cNvPr>
+          <p:cNvSpPr txBox="1"/>
+          <p:nvPr/>
+        </p:nvSpPr>
+        <p:spPr>
+          <a:xfrm>
+            <a:off x="2040685" y="109100"/>
+            <a:ext cx="1212769" cy="584775"/>
+          </a:xfrm>
+          <a:prstGeom prst="rect">
+            <a:avLst/>
+          </a:prstGeom>
+        </p:spPr>
+        <p:style>
+          <a:lnRef idx="2">
+            <a:schemeClr val="dk1"/>
+          </a:lnRef>
+          <a:fillRef idx="1">
+            <a:schemeClr val="lt1"/>
+          </a:fillRef>
+          <a:effectRef idx="0">
+            <a:schemeClr val="dk1"/>
+          </a:effectRef>
+          <a:fontRef idx="minor">
+            <a:schemeClr val="dk1"/>
+          </a:fontRef>
+        </p:style>
+        <p:txBody>
+          <a:bodyPr wrap="none" rtlCol="0">
+            <a:spAutoFit/>
+          </a:bodyPr>
+          <a:lstStyle/>
+          <a:p>
+            <a:pPr algn="ctr"/>
+            <a:r>
+              <a:rPr lang="en-US" b="1" dirty="0"/>
+              <a:t>Climate</a:t>
+            </a:r>
+          </a:p>
+          <a:p>
+            <a:pPr algn="ctr"/>
+            <a:r>
+              <a:rPr lang="en-US" sz="1400" i="1" dirty="0"/>
+              <a:t>WorldClim 2.0</a:t>
+            </a:r>
+          </a:p>
+        </p:txBody>
+      </p:sp>
+      <p:sp>
+        <p:nvSpPr>
+          <p:cNvPr id="85" name="TextBox 84">
+            <a:extLst>
+              <a:ext uri="{FF2B5EF4-FFF2-40B4-BE49-F238E27FC236}">
+                <a16:creationId xmlns:a16="http://schemas.microsoft.com/office/drawing/2014/main" id="{B97B5199-92A5-4B37-B2A9-7F171A91A5D5}"/>
+              </a:ext>
+            </a:extLst>
+          </p:cNvPr>
+          <p:cNvSpPr txBox="1"/>
+          <p:nvPr/>
+        </p:nvSpPr>
+        <p:spPr>
+          <a:xfrm>
+            <a:off x="4568825" y="93980"/>
+            <a:ext cx="1394804" cy="584775"/>
+          </a:xfrm>
+          <a:prstGeom prst="rect">
+            <a:avLst/>
+          </a:prstGeom>
+        </p:spPr>
+        <p:style>
+          <a:lnRef idx="2">
+            <a:schemeClr val="dk1"/>
+          </a:lnRef>
+          <a:fillRef idx="1">
+            <a:schemeClr val="lt1"/>
+          </a:fillRef>
+          <a:effectRef idx="0">
+            <a:schemeClr val="dk1"/>
+          </a:effectRef>
+          <a:fontRef idx="minor">
+            <a:schemeClr val="dk1"/>
+          </a:fontRef>
+        </p:style>
+        <p:txBody>
+          <a:bodyPr wrap="none" rtlCol="0">
+            <a:spAutoFit/>
+          </a:bodyPr>
+          <a:lstStyle/>
+          <a:p>
+            <a:pPr algn="ctr"/>
+            <a:r>
+              <a:rPr lang="en-US" b="1" dirty="0"/>
+              <a:t>Study Extent</a:t>
+            </a:r>
+          </a:p>
+          <a:p>
+            <a:pPr algn="ctr"/>
+            <a:endParaRPr lang="en-US" sz="1400" i="1" dirty="0"/>
+          </a:p>
+        </p:txBody>
+      </p:sp>
+      <p:sp>
+        <p:nvSpPr>
+          <p:cNvPr id="86" name="TextBox 85">
+            <a:extLst>
+              <a:ext uri="{FF2B5EF4-FFF2-40B4-BE49-F238E27FC236}">
+                <a16:creationId xmlns:a16="http://schemas.microsoft.com/office/drawing/2014/main" id="{8517AD3C-E670-40A9-B476-B3693B2484A8}"/>
+              </a:ext>
+            </a:extLst>
+          </p:cNvPr>
+          <p:cNvSpPr txBox="1"/>
+          <p:nvPr/>
+        </p:nvSpPr>
+        <p:spPr>
+          <a:xfrm>
+            <a:off x="6501085" y="93980"/>
+            <a:ext cx="891591" cy="584775"/>
+          </a:xfrm>
+          <a:prstGeom prst="rect">
+            <a:avLst/>
+          </a:prstGeom>
+        </p:spPr>
+        <p:style>
+          <a:lnRef idx="2">
+            <a:schemeClr val="dk1"/>
+          </a:lnRef>
+          <a:fillRef idx="1">
+            <a:schemeClr val="lt1"/>
+          </a:fillRef>
+          <a:effectRef idx="0">
+            <a:schemeClr val="dk1"/>
+          </a:effectRef>
+          <a:fontRef idx="minor">
+            <a:schemeClr val="dk1"/>
+          </a:fontRef>
+        </p:style>
+        <p:txBody>
+          <a:bodyPr wrap="none" rtlCol="0">
+            <a:spAutoFit/>
+          </a:bodyPr>
+          <a:lstStyle/>
+          <a:p>
+            <a:pPr algn="ctr"/>
+            <a:r>
+              <a:rPr lang="en-US" b="1" dirty="0"/>
+              <a:t>Species</a:t>
+            </a:r>
+          </a:p>
+          <a:p>
+            <a:pPr algn="ctr"/>
+            <a:r>
+              <a:rPr lang="en-US" sz="1400" i="1" dirty="0"/>
+              <a:t>GBIF</a:t>
+            </a:r>
+          </a:p>
+        </p:txBody>
+      </p:sp>
+      <p:sp>
+        <p:nvSpPr>
+          <p:cNvPr id="87" name="TextBox 86">
+            <a:extLst>
+              <a:ext uri="{FF2B5EF4-FFF2-40B4-BE49-F238E27FC236}">
+                <a16:creationId xmlns:a16="http://schemas.microsoft.com/office/drawing/2014/main" id="{1CC659D7-506E-4341-923A-BB49BD098E41}"/>
+              </a:ext>
+            </a:extLst>
+          </p:cNvPr>
+          <p:cNvSpPr txBox="1"/>
+          <p:nvPr/>
+        </p:nvSpPr>
+        <p:spPr>
+          <a:xfrm>
+            <a:off x="10392975" y="109100"/>
+            <a:ext cx="705642" cy="584775"/>
+          </a:xfrm>
+          <a:prstGeom prst="rect">
+            <a:avLst/>
+          </a:prstGeom>
+        </p:spPr>
+        <p:style>
+          <a:lnRef idx="2">
+            <a:schemeClr val="dk1"/>
+          </a:lnRef>
+          <a:fillRef idx="1">
+            <a:schemeClr val="lt1"/>
+          </a:fillRef>
+          <a:effectRef idx="0">
+            <a:schemeClr val="dk1"/>
+          </a:effectRef>
+          <a:fontRef idx="minor">
+            <a:schemeClr val="dk1"/>
+          </a:fontRef>
+        </p:style>
+        <p:txBody>
+          <a:bodyPr wrap="none" rtlCol="0">
+            <a:spAutoFit/>
+          </a:bodyPr>
+          <a:lstStyle/>
+          <a:p>
+            <a:pPr algn="ctr"/>
+            <a:r>
+              <a:rPr lang="en-US" b="1" dirty="0"/>
+              <a:t>Cities</a:t>
+            </a:r>
+          </a:p>
+          <a:p>
+            <a:pPr algn="ctr"/>
+            <a:r>
+              <a:rPr lang="en-US" sz="1400" i="1" dirty="0"/>
+              <a:t>GPS</a:t>
+            </a:r>
+          </a:p>
+        </p:txBody>
+      </p:sp>
+      <p:sp>
+        <p:nvSpPr>
+          <p:cNvPr id="88" name="TextBox 87">
+            <a:extLst>
+              <a:ext uri="{FF2B5EF4-FFF2-40B4-BE49-F238E27FC236}">
+                <a16:creationId xmlns:a16="http://schemas.microsoft.com/office/drawing/2014/main" id="{97BE4A8A-C6DA-4CAE-BD6B-895F1CBA4CC4}"/>
+              </a:ext>
+            </a:extLst>
+          </p:cNvPr>
+          <p:cNvSpPr txBox="1"/>
+          <p:nvPr/>
+        </p:nvSpPr>
+        <p:spPr>
+          <a:xfrm>
+            <a:off x="1544902" y="1564335"/>
+            <a:ext cx="819648" cy="338554"/>
+          </a:xfrm>
+          <a:prstGeom prst="rect">
+            <a:avLst/>
+          </a:prstGeom>
+        </p:spPr>
+        <p:style>
+          <a:lnRef idx="2">
+            <a:schemeClr val="dk1"/>
+          </a:lnRef>
+          <a:fillRef idx="1">
+            <a:schemeClr val="lt1"/>
+          </a:fillRef>
+          <a:effectRef idx="0">
+            <a:schemeClr val="dk1"/>
+          </a:effectRef>
+          <a:fontRef idx="minor">
+            <a:schemeClr val="dk1"/>
+          </a:fontRef>
+        </p:style>
+        <p:txBody>
+          <a:bodyPr wrap="none" rtlCol="0">
+            <a:spAutoFit/>
+          </a:bodyPr>
+          <a:lstStyle/>
+          <a:p>
+            <a:r>
+              <a:rPr lang="en-US" sz="1600" dirty="0"/>
+              <a:t>Current</a:t>
+            </a:r>
+          </a:p>
+        </p:txBody>
+      </p:sp>
+      <p:cxnSp>
+        <p:nvCxnSpPr>
+          <p:cNvPr id="89" name="Straight Connector 88">
+            <a:extLst>
+              <a:ext uri="{FF2B5EF4-FFF2-40B4-BE49-F238E27FC236}">
+                <a16:creationId xmlns:a16="http://schemas.microsoft.com/office/drawing/2014/main" id="{20160F27-9E4C-40B8-884C-2B5D416C859B}"/>
+              </a:ext>
+            </a:extLst>
+          </p:cNvPr>
+          <p:cNvCxnSpPr>
+            <a:cxnSpLocks/>
+            <a:stCxn id="84" idx="2"/>
+          </p:cNvCxnSpPr>
+          <p:nvPr/>
+        </p:nvCxnSpPr>
+        <p:spPr>
+          <a:xfrm>
+            <a:off x="2647070" y="693875"/>
+            <a:ext cx="0" cy="681218"/>
+          </a:xfrm>
+          <a:prstGeom prst="line">
+            <a:avLst/>
+          </a:prstGeom>
+          <a:ln w="12700"/>
+        </p:spPr>
+        <p:style>
+          <a:lnRef idx="1">
+            <a:schemeClr val="accent1"/>
+          </a:lnRef>
+          <a:fillRef idx="0">
+            <a:schemeClr val="accent1"/>
+          </a:fillRef>
+          <a:effectRef idx="0">
+            <a:schemeClr val="accent1"/>
+          </a:effectRef>
+          <a:fontRef idx="minor">
+            <a:schemeClr val="tx1"/>
+          </a:fontRef>
+        </p:style>
+      </p:cxnSp>
+      <p:sp>
+        <p:nvSpPr>
+          <p:cNvPr id="90" name="TextBox 89">
+            <a:extLst>
+              <a:ext uri="{FF2B5EF4-FFF2-40B4-BE49-F238E27FC236}">
+                <a16:creationId xmlns:a16="http://schemas.microsoft.com/office/drawing/2014/main" id="{7E983913-4914-4EA8-976D-C8D9BEBEB7A1}"/>
+              </a:ext>
+            </a:extLst>
+          </p:cNvPr>
+          <p:cNvSpPr txBox="1"/>
+          <p:nvPr/>
+        </p:nvSpPr>
+        <p:spPr>
+          <a:xfrm>
+            <a:off x="3185840" y="1564335"/>
+            <a:ext cx="735009" cy="338554"/>
+          </a:xfrm>
+          <a:prstGeom prst="rect">
+            <a:avLst/>
+          </a:prstGeom>
+        </p:spPr>
+        <p:style>
+          <a:lnRef idx="2">
+            <a:schemeClr val="dk1"/>
+          </a:lnRef>
+          <a:fillRef idx="1">
+            <a:schemeClr val="lt1"/>
+          </a:fillRef>
+          <a:effectRef idx="0">
+            <a:schemeClr val="dk1"/>
+          </a:effectRef>
+          <a:fontRef idx="minor">
+            <a:schemeClr val="dk1"/>
+          </a:fontRef>
+        </p:style>
+        <p:txBody>
+          <a:bodyPr wrap="none" rtlCol="0">
+            <a:spAutoFit/>
+          </a:bodyPr>
+          <a:lstStyle/>
+          <a:p>
+            <a:r>
+              <a:rPr lang="en-US" sz="1600" dirty="0"/>
+              <a:t>Future</a:t>
+            </a:r>
+          </a:p>
+        </p:txBody>
+      </p:sp>
+      <p:cxnSp>
+        <p:nvCxnSpPr>
+          <p:cNvPr id="91" name="Straight Connector 90">
+            <a:extLst>
+              <a:ext uri="{FF2B5EF4-FFF2-40B4-BE49-F238E27FC236}">
+                <a16:creationId xmlns:a16="http://schemas.microsoft.com/office/drawing/2014/main" id="{1E475FB2-4D2E-4A3E-8251-B761A846C6DF}"/>
+              </a:ext>
+            </a:extLst>
+          </p:cNvPr>
+          <p:cNvCxnSpPr>
+            <a:cxnSpLocks/>
+          </p:cNvCxnSpPr>
+          <p:nvPr/>
+        </p:nvCxnSpPr>
+        <p:spPr>
+          <a:xfrm rot="16200000">
+            <a:off x="2768990" y="552133"/>
+            <a:ext cx="0" cy="1645920"/>
+          </a:xfrm>
+          <a:prstGeom prst="line">
+            <a:avLst/>
+          </a:prstGeom>
+          <a:ln w="12700"/>
+        </p:spPr>
+        <p:style>
+          <a:lnRef idx="1">
+            <a:schemeClr val="accent1"/>
+          </a:lnRef>
+          <a:fillRef idx="0">
+            <a:schemeClr val="accent1"/>
+          </a:fillRef>
+          <a:effectRef idx="0">
+            <a:schemeClr val="accent1"/>
+          </a:effectRef>
+          <a:fontRef idx="minor">
+            <a:schemeClr val="tx1"/>
+          </a:fontRef>
+        </p:style>
+      </p:cxnSp>
+      <p:cxnSp>
+        <p:nvCxnSpPr>
+          <p:cNvPr id="92" name="Straight Connector 91">
+            <a:extLst>
+              <a:ext uri="{FF2B5EF4-FFF2-40B4-BE49-F238E27FC236}">
+                <a16:creationId xmlns:a16="http://schemas.microsoft.com/office/drawing/2014/main" id="{74B3852D-AEF6-4E93-80F4-97D20D0477FB}"/>
+              </a:ext>
+            </a:extLst>
+          </p:cNvPr>
+          <p:cNvCxnSpPr/>
+          <p:nvPr/>
+        </p:nvCxnSpPr>
+        <p:spPr>
+          <a:xfrm>
+            <a:off x="1953650" y="1375092"/>
+            <a:ext cx="0" cy="182880"/>
+          </a:xfrm>
+          <a:prstGeom prst="line">
+            <a:avLst/>
+          </a:prstGeom>
+          <a:ln w="12700"/>
+        </p:spPr>
+        <p:style>
+          <a:lnRef idx="1">
+            <a:schemeClr val="accent1"/>
+          </a:lnRef>
+          <a:fillRef idx="0">
+            <a:schemeClr val="accent1"/>
+          </a:fillRef>
+          <a:effectRef idx="0">
+            <a:schemeClr val="accent1"/>
+          </a:effectRef>
+          <a:fontRef idx="minor">
+            <a:schemeClr val="tx1"/>
+          </a:fontRef>
+        </p:style>
+      </p:cxnSp>
+      <p:cxnSp>
+        <p:nvCxnSpPr>
+          <p:cNvPr id="93" name="Straight Connector 92">
+            <a:extLst>
+              <a:ext uri="{FF2B5EF4-FFF2-40B4-BE49-F238E27FC236}">
+                <a16:creationId xmlns:a16="http://schemas.microsoft.com/office/drawing/2014/main" id="{FC757D39-1C47-4F18-8159-9B61B1097082}"/>
+              </a:ext>
+            </a:extLst>
+          </p:cNvPr>
+          <p:cNvCxnSpPr/>
+          <p:nvPr/>
+        </p:nvCxnSpPr>
+        <p:spPr>
+          <a:xfrm>
+            <a:off x="3584330" y="1380806"/>
+            <a:ext cx="0" cy="182880"/>
+          </a:xfrm>
+          <a:prstGeom prst="line">
+            <a:avLst/>
+          </a:prstGeom>
+          <a:ln w="12700"/>
+        </p:spPr>
+        <p:style>
+          <a:lnRef idx="1">
+            <a:schemeClr val="accent1"/>
+          </a:lnRef>
+          <a:fillRef idx="0">
+            <a:schemeClr val="accent1"/>
+          </a:fillRef>
+          <a:effectRef idx="0">
+            <a:schemeClr val="accent1"/>
+          </a:effectRef>
+          <a:fontRef idx="minor">
+            <a:schemeClr val="tx1"/>
+          </a:fontRef>
+        </p:style>
+      </p:cxnSp>
+      <p:cxnSp>
+        <p:nvCxnSpPr>
+          <p:cNvPr id="94" name="Straight Connector 93">
+            <a:extLst>
+              <a:ext uri="{FF2B5EF4-FFF2-40B4-BE49-F238E27FC236}">
+                <a16:creationId xmlns:a16="http://schemas.microsoft.com/office/drawing/2014/main" id="{C292A90A-36D1-4AC0-BD11-5AFEE64132C7}"/>
+              </a:ext>
+            </a:extLst>
+          </p:cNvPr>
+          <p:cNvCxnSpPr>
+            <a:cxnSpLocks/>
+          </p:cNvCxnSpPr>
+          <p:nvPr/>
+        </p:nvCxnSpPr>
+        <p:spPr>
+          <a:xfrm>
+            <a:off x="3583060" y="1915251"/>
+            <a:ext cx="0" cy="2517861"/>
+          </a:xfrm>
+          <a:prstGeom prst="line">
+            <a:avLst/>
+          </a:prstGeom>
+          <a:ln w="12700"/>
+        </p:spPr>
+        <p:style>
+          <a:lnRef idx="1">
+            <a:schemeClr val="accent1"/>
+          </a:lnRef>
+          <a:fillRef idx="0">
+            <a:schemeClr val="accent1"/>
+          </a:fillRef>
+          <a:effectRef idx="0">
+            <a:schemeClr val="accent1"/>
+          </a:effectRef>
+          <a:fontRef idx="minor">
+            <a:schemeClr val="tx1"/>
+          </a:fontRef>
+        </p:style>
+      </p:cxnSp>
+      <p:sp>
+        <p:nvSpPr>
+          <p:cNvPr id="95" name="TextBox 94">
+            <a:extLst>
+              <a:ext uri="{FF2B5EF4-FFF2-40B4-BE49-F238E27FC236}">
+                <a16:creationId xmlns:a16="http://schemas.microsoft.com/office/drawing/2014/main" id="{5205C337-762A-45A0-99E2-CA0A18F6FF13}"/>
+              </a:ext>
+            </a:extLst>
+          </p:cNvPr>
+          <p:cNvSpPr txBox="1"/>
+          <p:nvPr/>
+        </p:nvSpPr>
+        <p:spPr>
+          <a:xfrm>
+            <a:off x="2175786" y="3355608"/>
+            <a:ext cx="2805576" cy="677108"/>
+          </a:xfrm>
+          <a:prstGeom prst="rect">
+            <a:avLst/>
+          </a:prstGeom>
+        </p:spPr>
+        <p:style>
+          <a:lnRef idx="2">
+            <a:schemeClr val="dk1"/>
+          </a:lnRef>
+          <a:fillRef idx="1">
+            <a:schemeClr val="lt1"/>
+          </a:fillRef>
+          <a:effectRef idx="0">
+            <a:schemeClr val="dk1"/>
+          </a:effectRef>
+          <a:fontRef idx="minor">
+            <a:schemeClr val="dk1"/>
+          </a:fontRef>
+        </p:style>
+        <p:txBody>
+          <a:bodyPr wrap="none" rtlCol="0">
+            <a:spAutoFit/>
+          </a:bodyPr>
+          <a:lstStyle/>
+          <a:p>
+            <a:pPr algn="ctr"/>
+            <a:r>
+              <a:rPr lang="en-US" sz="1600" dirty="0"/>
+              <a:t>6 GCMs</a:t>
+            </a:r>
+          </a:p>
+          <a:p>
+            <a:pPr algn="ctr"/>
+            <a:r>
+              <a:rPr lang="en-US" sz="1100" i="1" dirty="0"/>
+              <a:t>Ensemble: CanESM5, MRI-ESM2-0, MIROC6, </a:t>
+            </a:r>
+          </a:p>
+          <a:p>
+            <a:pPr algn="ctr"/>
+            <a:r>
+              <a:rPr lang="en-US" sz="1100" i="1" dirty="0"/>
+              <a:t>CNRM-ESM2-1, IPSL-CM6A-LR, BCC-CSM2-MR</a:t>
+            </a:r>
+          </a:p>
+        </p:txBody>
+      </p:sp>
+      <p:sp>
+        <p:nvSpPr>
+          <p:cNvPr id="97" name="TextBox 96">
+            <a:extLst>
+              <a:ext uri="{FF2B5EF4-FFF2-40B4-BE49-F238E27FC236}">
+                <a16:creationId xmlns:a16="http://schemas.microsoft.com/office/drawing/2014/main" id="{4C69D30A-D090-48F2-B41C-6F842010EC1B}"/>
+              </a:ext>
+            </a:extLst>
+          </p:cNvPr>
+          <p:cNvSpPr txBox="1"/>
+          <p:nvPr/>
+        </p:nvSpPr>
+        <p:spPr>
+          <a:xfrm>
+            <a:off x="2728531" y="2755137"/>
+            <a:ext cx="1633781" cy="507831"/>
+          </a:xfrm>
+          <a:prstGeom prst="rect">
+            <a:avLst/>
+          </a:prstGeom>
+        </p:spPr>
+        <p:style>
+          <a:lnRef idx="2">
+            <a:schemeClr val="dk1"/>
+          </a:lnRef>
+          <a:fillRef idx="1">
+            <a:schemeClr val="lt1"/>
+          </a:fillRef>
+          <a:effectRef idx="0">
+            <a:schemeClr val="dk1"/>
+          </a:effectRef>
+          <a:fontRef idx="minor">
+            <a:schemeClr val="dk1"/>
+          </a:fontRef>
+        </p:style>
+        <p:txBody>
+          <a:bodyPr wrap="none" rtlCol="0">
+            <a:spAutoFit/>
+          </a:bodyPr>
+          <a:lstStyle/>
+          <a:p>
+            <a:pPr algn="ctr"/>
+            <a:r>
+              <a:rPr lang="en-US" sz="1600" dirty="0"/>
+              <a:t>3 SSPs</a:t>
+            </a:r>
+          </a:p>
+          <a:p>
+            <a:pPr algn="ctr"/>
+            <a:r>
+              <a:rPr lang="en-US" sz="1100" i="1" dirty="0"/>
+              <a:t>SSP 126, SSP 370, SSP585</a:t>
+            </a:r>
+          </a:p>
+        </p:txBody>
+      </p:sp>
+      <p:sp>
+        <p:nvSpPr>
+          <p:cNvPr id="99" name="TextBox 98">
+            <a:extLst>
+              <a:ext uri="{FF2B5EF4-FFF2-40B4-BE49-F238E27FC236}">
+                <a16:creationId xmlns:a16="http://schemas.microsoft.com/office/drawing/2014/main" id="{77A6F66B-F6F9-466E-BF54-65FACB2CE5D8}"/>
+              </a:ext>
+            </a:extLst>
+          </p:cNvPr>
+          <p:cNvSpPr txBox="1"/>
+          <p:nvPr/>
+        </p:nvSpPr>
+        <p:spPr>
+          <a:xfrm>
+            <a:off x="2830160" y="2149211"/>
+            <a:ext cx="1492716" cy="507831"/>
+          </a:xfrm>
+          <a:prstGeom prst="rect">
+            <a:avLst/>
+          </a:prstGeom>
+        </p:spPr>
+        <p:style>
+          <a:lnRef idx="2">
+            <a:schemeClr val="dk1"/>
+          </a:lnRef>
+          <a:fillRef idx="1">
+            <a:schemeClr val="lt1"/>
+          </a:fillRef>
+          <a:effectRef idx="0">
+            <a:schemeClr val="dk1"/>
+          </a:effectRef>
+          <a:fontRef idx="minor">
+            <a:schemeClr val="dk1"/>
+          </a:fontRef>
+        </p:style>
+        <p:txBody>
+          <a:bodyPr wrap="none" rtlCol="0">
+            <a:spAutoFit/>
+          </a:bodyPr>
+          <a:lstStyle/>
+          <a:p>
+            <a:pPr algn="ctr"/>
+            <a:r>
+              <a:rPr lang="en-US" sz="1600" dirty="0"/>
+              <a:t>2 Timeframes</a:t>
+            </a:r>
+          </a:p>
+          <a:p>
+            <a:pPr algn="ctr"/>
+            <a:r>
+              <a:rPr lang="en-US" sz="1100" i="1" dirty="0"/>
+              <a:t>2041-2060, 2081-2100</a:t>
+            </a:r>
+          </a:p>
+        </p:txBody>
+      </p:sp>
+      <p:cxnSp>
+        <p:nvCxnSpPr>
+          <p:cNvPr id="100" name="Straight Connector 99">
+            <a:extLst>
+              <a:ext uri="{FF2B5EF4-FFF2-40B4-BE49-F238E27FC236}">
+                <a16:creationId xmlns:a16="http://schemas.microsoft.com/office/drawing/2014/main" id="{D059EEDA-4464-4E14-912A-F5D4B51CB91F}"/>
+              </a:ext>
+            </a:extLst>
+          </p:cNvPr>
+          <p:cNvCxnSpPr>
+            <a:cxnSpLocks/>
+          </p:cNvCxnSpPr>
+          <p:nvPr/>
+        </p:nvCxnSpPr>
+        <p:spPr>
+          <a:xfrm>
+            <a:off x="1946030" y="1908901"/>
+            <a:ext cx="0" cy="2523399"/>
+          </a:xfrm>
+          <a:prstGeom prst="line">
+            <a:avLst/>
+          </a:prstGeom>
+          <a:ln w="12700"/>
+        </p:spPr>
+        <p:style>
+          <a:lnRef idx="1">
+            <a:schemeClr val="accent1"/>
+          </a:lnRef>
+          <a:fillRef idx="0">
+            <a:schemeClr val="accent1"/>
+          </a:fillRef>
+          <a:effectRef idx="0">
+            <a:schemeClr val="accent1"/>
+          </a:effectRef>
+          <a:fontRef idx="minor">
+            <a:schemeClr val="tx1"/>
+          </a:fontRef>
+        </p:style>
+      </p:cxnSp>
+      <p:cxnSp>
+        <p:nvCxnSpPr>
+          <p:cNvPr id="102" name="Straight Connector 101">
+            <a:extLst>
+              <a:ext uri="{FF2B5EF4-FFF2-40B4-BE49-F238E27FC236}">
+                <a16:creationId xmlns:a16="http://schemas.microsoft.com/office/drawing/2014/main" id="{34CC99C1-9DE1-4B27-9B0B-4C8928FA0684}"/>
+              </a:ext>
+            </a:extLst>
+          </p:cNvPr>
+          <p:cNvCxnSpPr>
+            <a:cxnSpLocks/>
+          </p:cNvCxnSpPr>
+          <p:nvPr/>
+        </p:nvCxnSpPr>
+        <p:spPr>
+          <a:xfrm>
+            <a:off x="5321689" y="693875"/>
+            <a:ext cx="0" cy="249100"/>
+          </a:xfrm>
+          <a:prstGeom prst="line">
+            <a:avLst/>
+          </a:prstGeom>
+          <a:ln w="12700"/>
+        </p:spPr>
+        <p:style>
+          <a:lnRef idx="1">
+            <a:schemeClr val="accent1"/>
+          </a:lnRef>
+          <a:fillRef idx="0">
+            <a:schemeClr val="accent1"/>
+          </a:fillRef>
+          <a:effectRef idx="0">
+            <a:schemeClr val="accent1"/>
+          </a:effectRef>
+          <a:fontRef idx="minor">
+            <a:schemeClr val="tx1"/>
+          </a:fontRef>
+        </p:style>
+      </p:cxnSp>
+      <p:sp>
+        <p:nvSpPr>
+          <p:cNvPr id="103" name="TextBox 102">
+            <a:extLst>
+              <a:ext uri="{FF2B5EF4-FFF2-40B4-BE49-F238E27FC236}">
+                <a16:creationId xmlns:a16="http://schemas.microsoft.com/office/drawing/2014/main" id="{FB857C80-5FD5-48F0-8324-D0B2BBD85F06}"/>
+              </a:ext>
+            </a:extLst>
+          </p:cNvPr>
+          <p:cNvSpPr txBox="1"/>
+          <p:nvPr/>
+        </p:nvSpPr>
+        <p:spPr>
+          <a:xfrm>
+            <a:off x="4566043" y="948999"/>
+            <a:ext cx="1513556" cy="507831"/>
+          </a:xfrm>
+          <a:prstGeom prst="rect">
+            <a:avLst/>
+          </a:prstGeom>
+        </p:spPr>
+        <p:style>
+          <a:lnRef idx="2">
+            <a:schemeClr val="dk1"/>
+          </a:lnRef>
+          <a:fillRef idx="1">
+            <a:schemeClr val="lt1"/>
+          </a:fillRef>
+          <a:effectRef idx="0">
+            <a:schemeClr val="dk1"/>
+          </a:effectRef>
+          <a:fontRef idx="minor">
+            <a:schemeClr val="dk1"/>
+          </a:fontRef>
+        </p:style>
+        <p:txBody>
+          <a:bodyPr wrap="none" rtlCol="0">
+            <a:spAutoFit/>
+          </a:bodyPr>
+          <a:lstStyle/>
+          <a:p>
+            <a:pPr algn="ctr"/>
+            <a:r>
+              <a:rPr lang="en-US" sz="1600" dirty="0"/>
+              <a:t>Crop</a:t>
+            </a:r>
+          </a:p>
+          <a:p>
+            <a:pPr algn="ctr"/>
+            <a:r>
+              <a:rPr lang="en-US" sz="1100" i="1" dirty="0"/>
+              <a:t>East-North Hemisphere</a:t>
+            </a:r>
+          </a:p>
+        </p:txBody>
+      </p:sp>
+      <p:cxnSp>
+        <p:nvCxnSpPr>
+          <p:cNvPr id="104" name="Straight Connector 103">
+            <a:extLst>
+              <a:ext uri="{FF2B5EF4-FFF2-40B4-BE49-F238E27FC236}">
+                <a16:creationId xmlns:a16="http://schemas.microsoft.com/office/drawing/2014/main" id="{7E1667E5-49B1-40D9-9FE4-17DAA0C05B02}"/>
+              </a:ext>
+            </a:extLst>
+          </p:cNvPr>
+          <p:cNvCxnSpPr>
+            <a:cxnSpLocks/>
+            <a:stCxn id="103" idx="2"/>
+          </p:cNvCxnSpPr>
+          <p:nvPr/>
+        </p:nvCxnSpPr>
+        <p:spPr>
+          <a:xfrm flipH="1">
+            <a:off x="5321691" y="1456830"/>
+            <a:ext cx="1130" cy="2975470"/>
+          </a:xfrm>
+          <a:prstGeom prst="line">
+            <a:avLst/>
+          </a:prstGeom>
+          <a:ln w="12700"/>
+        </p:spPr>
+        <p:style>
+          <a:lnRef idx="1">
+            <a:schemeClr val="accent1"/>
+          </a:lnRef>
+          <a:fillRef idx="0">
+            <a:schemeClr val="accent1"/>
+          </a:fillRef>
+          <a:effectRef idx="0">
+            <a:schemeClr val="accent1"/>
+          </a:effectRef>
+          <a:fontRef idx="minor">
+            <a:schemeClr val="tx1"/>
+          </a:fontRef>
+        </p:style>
+      </p:cxnSp>
+      <p:sp>
+        <p:nvSpPr>
+          <p:cNvPr id="105" name="TextBox 104">
+            <a:extLst>
+              <a:ext uri="{FF2B5EF4-FFF2-40B4-BE49-F238E27FC236}">
+                <a16:creationId xmlns:a16="http://schemas.microsoft.com/office/drawing/2014/main" id="{E0A0AB0E-837C-4331-80DB-3E363F381EB5}"/>
+              </a:ext>
+            </a:extLst>
+          </p:cNvPr>
+          <p:cNvSpPr txBox="1"/>
+          <p:nvPr/>
+        </p:nvSpPr>
+        <p:spPr>
+          <a:xfrm>
+            <a:off x="6224646" y="1351413"/>
+            <a:ext cx="1475789" cy="677108"/>
+          </a:xfrm>
+          <a:prstGeom prst="rect">
+            <a:avLst/>
+          </a:prstGeom>
+        </p:spPr>
+        <p:style>
+          <a:lnRef idx="2">
+            <a:schemeClr val="dk1"/>
+          </a:lnRef>
+          <a:fillRef idx="1">
+            <a:schemeClr val="lt1"/>
+          </a:fillRef>
+          <a:effectRef idx="0">
+            <a:schemeClr val="dk1"/>
+          </a:effectRef>
+          <a:fontRef idx="minor">
+            <a:schemeClr val="dk1"/>
+          </a:fontRef>
+        </p:style>
+        <p:txBody>
+          <a:bodyPr wrap="none" rtlCol="0">
+            <a:spAutoFit/>
+          </a:bodyPr>
+          <a:lstStyle/>
+          <a:p>
+            <a:pPr algn="ctr"/>
+            <a:r>
+              <a:rPr lang="en-US" sz="1600" dirty="0"/>
+              <a:t>Identify species</a:t>
+            </a:r>
+          </a:p>
+          <a:p>
+            <a:pPr algn="ctr"/>
+            <a:r>
+              <a:rPr lang="en-US" sz="1100" i="1" dirty="0"/>
+              <a:t>n &gt;= 10 within</a:t>
+            </a:r>
+          </a:p>
+          <a:p>
+            <a:pPr algn="ctr"/>
+            <a:r>
+              <a:rPr lang="en-US" sz="1100" i="1" dirty="0"/>
+              <a:t> 20 km of each city</a:t>
+            </a:r>
+          </a:p>
+        </p:txBody>
+      </p:sp>
+      <p:cxnSp>
+        <p:nvCxnSpPr>
+          <p:cNvPr id="107" name="Straight Connector 106">
+            <a:extLst>
+              <a:ext uri="{FF2B5EF4-FFF2-40B4-BE49-F238E27FC236}">
+                <a16:creationId xmlns:a16="http://schemas.microsoft.com/office/drawing/2014/main" id="{CAF76514-B489-4C71-82EA-3E4ECB224574}"/>
+              </a:ext>
+            </a:extLst>
+          </p:cNvPr>
+          <p:cNvCxnSpPr>
+            <a:cxnSpLocks/>
+          </p:cNvCxnSpPr>
+          <p:nvPr/>
+        </p:nvCxnSpPr>
+        <p:spPr>
+          <a:xfrm>
+            <a:off x="6946880" y="2028521"/>
+            <a:ext cx="0" cy="252399"/>
+          </a:xfrm>
+          <a:prstGeom prst="line">
+            <a:avLst/>
+          </a:prstGeom>
+          <a:ln w="12700"/>
+        </p:spPr>
+        <p:style>
+          <a:lnRef idx="1">
+            <a:schemeClr val="accent1"/>
+          </a:lnRef>
+          <a:fillRef idx="0">
+            <a:schemeClr val="accent1"/>
+          </a:fillRef>
+          <a:effectRef idx="0">
+            <a:schemeClr val="accent1"/>
+          </a:effectRef>
+          <a:fontRef idx="minor">
+            <a:schemeClr val="tx1"/>
+          </a:fontRef>
+        </p:style>
+      </p:cxnSp>
+      <p:sp>
+        <p:nvSpPr>
+          <p:cNvPr id="108" name="TextBox 107">
+            <a:extLst>
+              <a:ext uri="{FF2B5EF4-FFF2-40B4-BE49-F238E27FC236}">
+                <a16:creationId xmlns:a16="http://schemas.microsoft.com/office/drawing/2014/main" id="{00B42BD4-5C7F-4D84-B0E9-602F94A303B7}"/>
+              </a:ext>
+            </a:extLst>
+          </p:cNvPr>
+          <p:cNvSpPr txBox="1"/>
+          <p:nvPr/>
+        </p:nvSpPr>
+        <p:spPr>
+          <a:xfrm>
+            <a:off x="6200435" y="2270413"/>
+            <a:ext cx="1524200" cy="338554"/>
+          </a:xfrm>
+          <a:prstGeom prst="rect">
+            <a:avLst/>
+          </a:prstGeom>
+        </p:spPr>
+        <p:style>
+          <a:lnRef idx="2">
+            <a:schemeClr val="dk1"/>
+          </a:lnRef>
+          <a:fillRef idx="1">
+            <a:schemeClr val="lt1"/>
+          </a:fillRef>
+          <a:effectRef idx="0">
+            <a:schemeClr val="dk1"/>
+          </a:effectRef>
+          <a:fontRef idx="minor">
+            <a:schemeClr val="dk1"/>
+          </a:fontRef>
+        </p:style>
+        <p:txBody>
+          <a:bodyPr wrap="none" rtlCol="0">
+            <a:spAutoFit/>
+          </a:bodyPr>
+          <a:lstStyle/>
+          <a:p>
+            <a:pPr algn="ctr"/>
+            <a:r>
+              <a:rPr lang="en-US" sz="1600" dirty="0"/>
+              <a:t>Total species list</a:t>
+            </a:r>
+            <a:endParaRPr lang="en-US" sz="1100" i="1" dirty="0"/>
+          </a:p>
+        </p:txBody>
+      </p:sp>
+      <p:sp>
+        <p:nvSpPr>
+          <p:cNvPr id="109" name="TextBox 108">
+            <a:extLst>
+              <a:ext uri="{FF2B5EF4-FFF2-40B4-BE49-F238E27FC236}">
+                <a16:creationId xmlns:a16="http://schemas.microsoft.com/office/drawing/2014/main" id="{7C2067A7-B806-4164-A5AD-0E84F99294C5}"/>
+              </a:ext>
+            </a:extLst>
+          </p:cNvPr>
+          <p:cNvSpPr txBox="1"/>
+          <p:nvPr/>
+        </p:nvSpPr>
+        <p:spPr>
+          <a:xfrm>
+            <a:off x="6110416" y="2928126"/>
+            <a:ext cx="1704249" cy="507831"/>
+          </a:xfrm>
+          <a:prstGeom prst="rect">
+            <a:avLst/>
+          </a:prstGeom>
+        </p:spPr>
+        <p:style>
+          <a:lnRef idx="2">
+            <a:schemeClr val="dk1"/>
+          </a:lnRef>
+          <a:fillRef idx="1">
+            <a:schemeClr val="lt1"/>
+          </a:fillRef>
+          <a:effectRef idx="0">
+            <a:schemeClr val="dk1"/>
+          </a:effectRef>
+          <a:fontRef idx="minor">
+            <a:schemeClr val="dk1"/>
+          </a:fontRef>
+        </p:style>
+        <p:txBody>
+          <a:bodyPr wrap="none" rtlCol="0">
+            <a:spAutoFit/>
+          </a:bodyPr>
+          <a:lstStyle/>
+          <a:p>
+            <a:pPr algn="ctr"/>
+            <a:r>
+              <a:rPr lang="en-US" sz="1600" dirty="0"/>
+              <a:t>Download records</a:t>
+            </a:r>
+          </a:p>
+          <a:p>
+            <a:pPr algn="ctr"/>
+            <a:r>
+              <a:rPr lang="en-US" sz="1100" i="1" dirty="0"/>
+              <a:t>100k Records, 2000-2020</a:t>
+            </a:r>
+          </a:p>
+        </p:txBody>
+      </p:sp>
+      <p:cxnSp>
+        <p:nvCxnSpPr>
+          <p:cNvPr id="110" name="Straight Connector 109">
+            <a:extLst>
+              <a:ext uri="{FF2B5EF4-FFF2-40B4-BE49-F238E27FC236}">
+                <a16:creationId xmlns:a16="http://schemas.microsoft.com/office/drawing/2014/main" id="{94FA007A-E1B1-455D-A72F-39DB80680E66}"/>
+              </a:ext>
+            </a:extLst>
+          </p:cNvPr>
+          <p:cNvCxnSpPr>
+            <a:cxnSpLocks/>
+            <a:endCxn id="109" idx="0"/>
+          </p:cNvCxnSpPr>
+          <p:nvPr/>
+        </p:nvCxnSpPr>
+        <p:spPr>
+          <a:xfrm>
+            <a:off x="6962535" y="2608967"/>
+            <a:ext cx="6" cy="319159"/>
+          </a:xfrm>
+          <a:prstGeom prst="line">
+            <a:avLst/>
+          </a:prstGeom>
+          <a:ln w="12700"/>
+        </p:spPr>
+        <p:style>
+          <a:lnRef idx="1">
+            <a:schemeClr val="accent1"/>
+          </a:lnRef>
+          <a:fillRef idx="0">
+            <a:schemeClr val="accent1"/>
+          </a:fillRef>
+          <a:effectRef idx="0">
+            <a:schemeClr val="accent1"/>
+          </a:effectRef>
+          <a:fontRef idx="minor">
+            <a:schemeClr val="tx1"/>
+          </a:fontRef>
+        </p:style>
+      </p:cxnSp>
+      <p:sp>
+        <p:nvSpPr>
+          <p:cNvPr id="111" name="TextBox 110">
+            <a:extLst>
+              <a:ext uri="{FF2B5EF4-FFF2-40B4-BE49-F238E27FC236}">
+                <a16:creationId xmlns:a16="http://schemas.microsoft.com/office/drawing/2014/main" id="{F32D5FA5-CF48-4FC6-9641-BFC59577D1C0}"/>
+              </a:ext>
+            </a:extLst>
+          </p:cNvPr>
+          <p:cNvSpPr txBox="1"/>
+          <p:nvPr/>
+        </p:nvSpPr>
+        <p:spPr>
+          <a:xfrm>
+            <a:off x="8973186" y="118397"/>
+            <a:ext cx="575799" cy="369332"/>
+          </a:xfrm>
+          <a:prstGeom prst="rect">
+            <a:avLst/>
+          </a:prstGeom>
+        </p:spPr>
+        <p:style>
+          <a:lnRef idx="2">
+            <a:schemeClr val="dk1"/>
+          </a:lnRef>
+          <a:fillRef idx="1">
+            <a:schemeClr val="lt1"/>
+          </a:fillRef>
+          <a:effectRef idx="0">
+            <a:schemeClr val="dk1"/>
+          </a:effectRef>
+          <a:fontRef idx="minor">
+            <a:schemeClr val="dk1"/>
+          </a:fontRef>
+        </p:style>
+        <p:txBody>
+          <a:bodyPr wrap="square" rtlCol="0">
+            <a:spAutoFit/>
+          </a:bodyPr>
+          <a:lstStyle/>
+          <a:p>
+            <a:pPr algn="ctr"/>
+            <a:r>
+              <a:rPr lang="en-US" b="1" dirty="0"/>
+              <a:t>Bias</a:t>
+            </a:r>
+          </a:p>
+        </p:txBody>
+      </p:sp>
+      <p:cxnSp>
+        <p:nvCxnSpPr>
+          <p:cNvPr id="112" name="Straight Connector 111">
+            <a:extLst>
+              <a:ext uri="{FF2B5EF4-FFF2-40B4-BE49-F238E27FC236}">
+                <a16:creationId xmlns:a16="http://schemas.microsoft.com/office/drawing/2014/main" id="{C7E91146-DB2C-4A40-B9A2-386C30E125CD}"/>
+              </a:ext>
+            </a:extLst>
+          </p:cNvPr>
+          <p:cNvCxnSpPr>
+            <a:cxnSpLocks/>
+            <a:stCxn id="109" idx="3"/>
+          </p:cNvCxnSpPr>
+          <p:nvPr/>
+        </p:nvCxnSpPr>
+        <p:spPr>
+          <a:xfrm>
+            <a:off x="7814665" y="3182042"/>
+            <a:ext cx="1446421" cy="0"/>
+          </a:xfrm>
+          <a:prstGeom prst="line">
+            <a:avLst/>
+          </a:prstGeom>
+          <a:ln w="12700"/>
+        </p:spPr>
+        <p:style>
+          <a:lnRef idx="1">
+            <a:schemeClr val="accent1"/>
+          </a:lnRef>
+          <a:fillRef idx="0">
+            <a:schemeClr val="accent1"/>
+          </a:fillRef>
+          <a:effectRef idx="0">
+            <a:schemeClr val="accent1"/>
+          </a:effectRef>
+          <a:fontRef idx="minor">
+            <a:schemeClr val="tx1"/>
+          </a:fontRef>
+        </p:style>
+      </p:cxnSp>
+      <p:cxnSp>
+        <p:nvCxnSpPr>
+          <p:cNvPr id="113" name="Straight Connector 112">
+            <a:extLst>
+              <a:ext uri="{FF2B5EF4-FFF2-40B4-BE49-F238E27FC236}">
+                <a16:creationId xmlns:a16="http://schemas.microsoft.com/office/drawing/2014/main" id="{D271FF0F-F0BA-443C-A90C-A098825C331D}"/>
+              </a:ext>
+            </a:extLst>
+          </p:cNvPr>
+          <p:cNvCxnSpPr>
+            <a:cxnSpLocks/>
+          </p:cNvCxnSpPr>
+          <p:nvPr/>
+        </p:nvCxnSpPr>
+        <p:spPr>
+          <a:xfrm>
+            <a:off x="6946874" y="3449636"/>
+            <a:ext cx="0" cy="970607"/>
+          </a:xfrm>
+          <a:prstGeom prst="line">
+            <a:avLst/>
+          </a:prstGeom>
+          <a:ln w="12700"/>
+        </p:spPr>
+        <p:style>
+          <a:lnRef idx="1">
+            <a:schemeClr val="accent1"/>
+          </a:lnRef>
+          <a:fillRef idx="0">
+            <a:schemeClr val="accent1"/>
+          </a:fillRef>
+          <a:effectRef idx="0">
+            <a:schemeClr val="accent1"/>
+          </a:effectRef>
+          <a:fontRef idx="minor">
+            <a:schemeClr val="tx1"/>
+          </a:fontRef>
+        </p:style>
+      </p:cxnSp>
+      <p:cxnSp>
+        <p:nvCxnSpPr>
+          <p:cNvPr id="114" name="Straight Connector 113">
+            <a:extLst>
+              <a:ext uri="{FF2B5EF4-FFF2-40B4-BE49-F238E27FC236}">
+                <a16:creationId xmlns:a16="http://schemas.microsoft.com/office/drawing/2014/main" id="{D6FA0FEC-6FCD-4956-BABA-825788417B05}"/>
+              </a:ext>
+            </a:extLst>
+          </p:cNvPr>
+          <p:cNvCxnSpPr>
+            <a:cxnSpLocks/>
+            <a:stCxn id="111" idx="2"/>
+          </p:cNvCxnSpPr>
+          <p:nvPr/>
+        </p:nvCxnSpPr>
+        <p:spPr>
+          <a:xfrm>
+            <a:off x="9261086" y="487729"/>
+            <a:ext cx="0" cy="3897581"/>
+          </a:xfrm>
+          <a:prstGeom prst="line">
+            <a:avLst/>
+          </a:prstGeom>
+          <a:ln w="12700"/>
+        </p:spPr>
+        <p:style>
+          <a:lnRef idx="1">
+            <a:schemeClr val="accent1"/>
+          </a:lnRef>
+          <a:fillRef idx="0">
+            <a:schemeClr val="accent1"/>
+          </a:fillRef>
+          <a:effectRef idx="0">
+            <a:schemeClr val="accent1"/>
+          </a:effectRef>
+          <a:fontRef idx="minor">
+            <a:schemeClr val="tx1"/>
+          </a:fontRef>
+        </p:style>
+      </p:cxnSp>
+      <p:cxnSp>
+        <p:nvCxnSpPr>
+          <p:cNvPr id="116" name="Straight Connector 115">
+            <a:extLst>
+              <a:ext uri="{FF2B5EF4-FFF2-40B4-BE49-F238E27FC236}">
+                <a16:creationId xmlns:a16="http://schemas.microsoft.com/office/drawing/2014/main" id="{4F002809-BC10-4F3A-A358-50F9F2516178}"/>
+              </a:ext>
+            </a:extLst>
+          </p:cNvPr>
+          <p:cNvCxnSpPr>
+            <a:cxnSpLocks/>
+          </p:cNvCxnSpPr>
+          <p:nvPr/>
+        </p:nvCxnSpPr>
+        <p:spPr>
+          <a:xfrm>
+            <a:off x="9261085" y="4134862"/>
+            <a:ext cx="18251" cy="1313733"/>
+          </a:xfrm>
+          <a:prstGeom prst="line">
+            <a:avLst/>
+          </a:prstGeom>
+          <a:ln w="12700"/>
+        </p:spPr>
+        <p:style>
+          <a:lnRef idx="1">
+            <a:schemeClr val="accent1"/>
+          </a:lnRef>
+          <a:fillRef idx="0">
+            <a:schemeClr val="accent1"/>
+          </a:fillRef>
+          <a:effectRef idx="0">
+            <a:schemeClr val="accent1"/>
+          </a:effectRef>
+          <a:fontRef idx="minor">
+            <a:schemeClr val="tx1"/>
+          </a:fontRef>
+        </p:style>
+      </p:cxnSp>
+      <p:cxnSp>
+        <p:nvCxnSpPr>
+          <p:cNvPr id="118" name="Straight Connector 117">
+            <a:extLst>
+              <a:ext uri="{FF2B5EF4-FFF2-40B4-BE49-F238E27FC236}">
+                <a16:creationId xmlns:a16="http://schemas.microsoft.com/office/drawing/2014/main" id="{B27D965C-30F6-4A6B-BEBB-A25574EE649B}"/>
+              </a:ext>
+            </a:extLst>
+          </p:cNvPr>
+          <p:cNvCxnSpPr>
+            <a:cxnSpLocks/>
+          </p:cNvCxnSpPr>
+          <p:nvPr/>
+        </p:nvCxnSpPr>
+        <p:spPr>
+          <a:xfrm>
+            <a:off x="10750668" y="695721"/>
+            <a:ext cx="0" cy="681218"/>
+          </a:xfrm>
+          <a:prstGeom prst="line">
+            <a:avLst/>
+          </a:prstGeom>
+          <a:ln w="12700"/>
+        </p:spPr>
+        <p:style>
+          <a:lnRef idx="1">
+            <a:schemeClr val="accent1"/>
+          </a:lnRef>
+          <a:fillRef idx="0">
+            <a:schemeClr val="accent1"/>
+          </a:fillRef>
+          <a:effectRef idx="0">
+            <a:schemeClr val="accent1"/>
+          </a:effectRef>
+          <a:fontRef idx="minor">
+            <a:schemeClr val="tx1"/>
+          </a:fontRef>
+        </p:style>
+      </p:cxnSp>
+      <p:sp>
+        <p:nvSpPr>
+          <p:cNvPr id="119" name="TextBox 118">
+            <a:extLst>
+              <a:ext uri="{FF2B5EF4-FFF2-40B4-BE49-F238E27FC236}">
+                <a16:creationId xmlns:a16="http://schemas.microsoft.com/office/drawing/2014/main" id="{A7FC49BB-FC49-48B7-98E6-82A88EC639AB}"/>
+              </a:ext>
+            </a:extLst>
+          </p:cNvPr>
+          <p:cNvSpPr txBox="1"/>
+          <p:nvPr/>
+        </p:nvSpPr>
+        <p:spPr>
+          <a:xfrm>
+            <a:off x="9736488" y="1376938"/>
+            <a:ext cx="2036135" cy="507831"/>
+          </a:xfrm>
+          <a:prstGeom prst="rect">
+            <a:avLst/>
+          </a:prstGeom>
+        </p:spPr>
+        <p:style>
+          <a:lnRef idx="2">
+            <a:schemeClr val="dk1"/>
+          </a:lnRef>
+          <a:fillRef idx="1">
+            <a:schemeClr val="lt1"/>
+          </a:fillRef>
+          <a:effectRef idx="0">
+            <a:schemeClr val="dk1"/>
+          </a:effectRef>
+          <a:fontRef idx="minor">
+            <a:schemeClr val="dk1"/>
+          </a:fontRef>
+        </p:style>
+        <p:txBody>
+          <a:bodyPr wrap="none" rtlCol="0">
+            <a:spAutoFit/>
+          </a:bodyPr>
+          <a:lstStyle/>
+          <a:p>
+            <a:pPr algn="ctr"/>
+            <a:r>
+              <a:rPr lang="en-US" sz="1600" dirty="0"/>
+              <a:t>City survey area</a:t>
+            </a:r>
+          </a:p>
+          <a:p>
+            <a:pPr algn="ctr"/>
+            <a:r>
+              <a:rPr lang="en-US" sz="1100" i="1" dirty="0"/>
+              <a:t>100 random points within 20 km</a:t>
+            </a:r>
+          </a:p>
+        </p:txBody>
+      </p:sp>
+      <p:cxnSp>
+        <p:nvCxnSpPr>
+          <p:cNvPr id="120" name="Straight Connector 119">
+            <a:extLst>
+              <a:ext uri="{FF2B5EF4-FFF2-40B4-BE49-F238E27FC236}">
+                <a16:creationId xmlns:a16="http://schemas.microsoft.com/office/drawing/2014/main" id="{403F428D-C73C-4188-97EA-58005E1C444E}"/>
+              </a:ext>
+            </a:extLst>
+          </p:cNvPr>
+          <p:cNvCxnSpPr>
+            <a:cxnSpLocks/>
+          </p:cNvCxnSpPr>
+          <p:nvPr/>
+        </p:nvCxnSpPr>
+        <p:spPr>
+          <a:xfrm>
+            <a:off x="10738086" y="1927749"/>
+            <a:ext cx="0" cy="2504551"/>
+          </a:xfrm>
+          <a:prstGeom prst="line">
+            <a:avLst/>
+          </a:prstGeom>
+          <a:ln w="12700"/>
+        </p:spPr>
+        <p:style>
+          <a:lnRef idx="1">
+            <a:schemeClr val="accent1"/>
+          </a:lnRef>
+          <a:fillRef idx="0">
+            <a:schemeClr val="accent1"/>
+          </a:fillRef>
+          <a:effectRef idx="0">
+            <a:schemeClr val="accent1"/>
+          </a:effectRef>
+          <a:fontRef idx="minor">
+            <a:schemeClr val="tx1"/>
+          </a:fontRef>
+        </p:style>
+      </p:cxnSp>
+      <p:cxnSp>
+        <p:nvCxnSpPr>
+          <p:cNvPr id="124" name="Straight Connector 123">
+            <a:extLst>
+              <a:ext uri="{FF2B5EF4-FFF2-40B4-BE49-F238E27FC236}">
+                <a16:creationId xmlns:a16="http://schemas.microsoft.com/office/drawing/2014/main" id="{DE077F8D-42B4-4B48-B555-CF617DFFC02C}"/>
+              </a:ext>
+            </a:extLst>
+          </p:cNvPr>
+          <p:cNvCxnSpPr>
+            <a:cxnSpLocks/>
+          </p:cNvCxnSpPr>
+          <p:nvPr/>
+        </p:nvCxnSpPr>
+        <p:spPr>
+          <a:xfrm>
+            <a:off x="6946874" y="4387850"/>
+            <a:ext cx="0" cy="479425"/>
+          </a:xfrm>
+          <a:prstGeom prst="line">
+            <a:avLst/>
+          </a:prstGeom>
+          <a:ln w="12700"/>
+        </p:spPr>
+        <p:style>
+          <a:lnRef idx="1">
+            <a:schemeClr val="accent1"/>
+          </a:lnRef>
+          <a:fillRef idx="0">
+            <a:schemeClr val="accent1"/>
+          </a:fillRef>
+          <a:effectRef idx="0">
+            <a:schemeClr val="accent1"/>
+          </a:effectRef>
+          <a:fontRef idx="minor">
+            <a:schemeClr val="tx1"/>
+          </a:fontRef>
+        </p:style>
+      </p:cxnSp>
+      <p:sp>
+        <p:nvSpPr>
+          <p:cNvPr id="125" name="TextBox 124">
+            <a:extLst>
+              <a:ext uri="{FF2B5EF4-FFF2-40B4-BE49-F238E27FC236}">
+                <a16:creationId xmlns:a16="http://schemas.microsoft.com/office/drawing/2014/main" id="{5B728DB3-26A0-4A44-9C9C-8E9B0FF043E5}"/>
+              </a:ext>
+            </a:extLst>
+          </p:cNvPr>
+          <p:cNvSpPr txBox="1"/>
+          <p:nvPr/>
+        </p:nvSpPr>
+        <p:spPr>
+          <a:xfrm>
+            <a:off x="5906365" y="4869127"/>
+            <a:ext cx="2081019" cy="507831"/>
+          </a:xfrm>
+          <a:prstGeom prst="rect">
+            <a:avLst/>
+          </a:prstGeom>
+        </p:spPr>
+        <p:style>
+          <a:lnRef idx="2">
+            <a:schemeClr val="dk1"/>
+          </a:lnRef>
+          <a:fillRef idx="1">
+            <a:schemeClr val="lt1"/>
+          </a:fillRef>
+          <a:effectRef idx="0">
+            <a:schemeClr val="dk1"/>
+          </a:effectRef>
+          <a:fontRef idx="minor">
+            <a:schemeClr val="dk1"/>
+          </a:fontRef>
+        </p:style>
+        <p:txBody>
+          <a:bodyPr wrap="none" rtlCol="0">
+            <a:spAutoFit/>
+          </a:bodyPr>
+          <a:lstStyle/>
+          <a:p>
+            <a:pPr algn="ctr"/>
+            <a:r>
+              <a:rPr lang="en-US" sz="1600" dirty="0"/>
+              <a:t>Thin occurrences</a:t>
+            </a:r>
+          </a:p>
+          <a:p>
+            <a:pPr algn="ctr"/>
+            <a:r>
+              <a:rPr lang="en-US" sz="1100" i="1" dirty="0"/>
+              <a:t>Reduce spatial duplicates &lt;10 km</a:t>
+            </a:r>
+          </a:p>
+        </p:txBody>
+      </p:sp>
+      <p:cxnSp>
+        <p:nvCxnSpPr>
+          <p:cNvPr id="134" name="Straight Connector 133">
+            <a:extLst>
+              <a:ext uri="{FF2B5EF4-FFF2-40B4-BE49-F238E27FC236}">
+                <a16:creationId xmlns:a16="http://schemas.microsoft.com/office/drawing/2014/main" id="{5466ED8E-3F55-41D7-9040-011D51936C11}"/>
+              </a:ext>
+            </a:extLst>
+          </p:cNvPr>
+          <p:cNvCxnSpPr>
+            <a:cxnSpLocks/>
+            <a:endCxn id="103" idx="1"/>
+          </p:cNvCxnSpPr>
+          <p:nvPr/>
+        </p:nvCxnSpPr>
+        <p:spPr>
+          <a:xfrm>
+            <a:off x="2647069" y="1202914"/>
+            <a:ext cx="1918974" cy="1"/>
+          </a:xfrm>
+          <a:prstGeom prst="line">
+            <a:avLst/>
+          </a:prstGeom>
+          <a:ln w="12700"/>
+        </p:spPr>
+        <p:style>
+          <a:lnRef idx="1">
+            <a:schemeClr val="accent1"/>
+          </a:lnRef>
+          <a:fillRef idx="0">
+            <a:schemeClr val="accent1"/>
+          </a:fillRef>
+          <a:effectRef idx="0">
+            <a:schemeClr val="accent1"/>
+          </a:effectRef>
+          <a:fontRef idx="minor">
+            <a:schemeClr val="tx1"/>
+          </a:fontRef>
+        </p:style>
+      </p:cxnSp>
+      <p:sp>
+        <p:nvSpPr>
+          <p:cNvPr id="140" name="Rectangle 139">
+            <a:extLst>
+              <a:ext uri="{FF2B5EF4-FFF2-40B4-BE49-F238E27FC236}">
+                <a16:creationId xmlns:a16="http://schemas.microsoft.com/office/drawing/2014/main" id="{C0B756DF-D0B5-4C0E-A8A7-112984686CBD}"/>
+              </a:ext>
+            </a:extLst>
+          </p:cNvPr>
+          <p:cNvSpPr/>
+          <p:nvPr/>
+        </p:nvSpPr>
+        <p:spPr>
+          <a:xfrm>
+            <a:off x="6855620" y="1133475"/>
+            <a:ext cx="205690" cy="140595"/>
+          </a:xfrm>
+          <a:prstGeom prst="rect">
+            <a:avLst/>
+          </a:prstGeom>
+          <a:solidFill>
+            <a:schemeClr val="bg1"/>
+          </a:solidFill>
+          <a:ln>
+            <a:noFill/>
+          </a:ln>
+        </p:spPr>
+        <p:style>
+          <a:lnRef idx="2">
+            <a:schemeClr val="accent1">
+              <a:shade val="50000"/>
+            </a:schemeClr>
+          </a:lnRef>
+          <a:fillRef idx="1">
+            <a:schemeClr val="accent1"/>
+          </a:fillRef>
+          <a:effectRef idx="0">
+            <a:schemeClr val="accent1"/>
+          </a:effectRef>
+          <a:fontRef idx="minor">
+            <a:schemeClr val="lt1"/>
+          </a:fontRef>
+        </p:style>
+        <p:txBody>
+          <a:bodyPr rtlCol="0" anchor="ctr"/>
+          <a:lstStyle/>
+          <a:p>
+            <a:pPr algn="ctr"/>
+            <a:endParaRPr lang="en-US"/>
+          </a:p>
+        </p:txBody>
+      </p:sp>
+      <p:cxnSp>
+        <p:nvCxnSpPr>
+          <p:cNvPr id="106" name="Straight Connector 105">
+            <a:extLst>
+              <a:ext uri="{FF2B5EF4-FFF2-40B4-BE49-F238E27FC236}">
+                <a16:creationId xmlns:a16="http://schemas.microsoft.com/office/drawing/2014/main" id="{81673941-263A-4196-AEA9-EB912B565BFF}"/>
+              </a:ext>
+            </a:extLst>
+          </p:cNvPr>
+          <p:cNvCxnSpPr>
+            <a:cxnSpLocks/>
+            <a:endCxn id="105" idx="0"/>
+          </p:cNvCxnSpPr>
+          <p:nvPr/>
+        </p:nvCxnSpPr>
+        <p:spPr>
+          <a:xfrm flipH="1">
+            <a:off x="6962541" y="678755"/>
+            <a:ext cx="3142" cy="672658"/>
+          </a:xfrm>
+          <a:prstGeom prst="line">
+            <a:avLst/>
+          </a:prstGeom>
+          <a:ln w="12700"/>
+        </p:spPr>
+        <p:style>
+          <a:lnRef idx="1">
+            <a:schemeClr val="accent1"/>
+          </a:lnRef>
+          <a:fillRef idx="0">
+            <a:schemeClr val="accent1"/>
+          </a:fillRef>
+          <a:effectRef idx="0">
+            <a:schemeClr val="accent1"/>
+          </a:effectRef>
+          <a:fontRef idx="minor">
+            <a:schemeClr val="tx1"/>
+          </a:fontRef>
+        </p:style>
+      </p:cxnSp>
+      <p:cxnSp>
+        <p:nvCxnSpPr>
+          <p:cNvPr id="142" name="Straight Connector 141">
+            <a:extLst>
+              <a:ext uri="{FF2B5EF4-FFF2-40B4-BE49-F238E27FC236}">
+                <a16:creationId xmlns:a16="http://schemas.microsoft.com/office/drawing/2014/main" id="{83B5F174-71F9-4F9C-A634-A657655BDEE2}"/>
+              </a:ext>
+            </a:extLst>
+          </p:cNvPr>
+          <p:cNvCxnSpPr>
+            <a:cxnSpLocks/>
+          </p:cNvCxnSpPr>
+          <p:nvPr/>
+        </p:nvCxnSpPr>
+        <p:spPr>
+          <a:xfrm flipH="1">
+            <a:off x="6819901" y="1155621"/>
+            <a:ext cx="73667" cy="91440"/>
+          </a:xfrm>
+          <a:prstGeom prst="line">
+            <a:avLst/>
+          </a:prstGeom>
+          <a:ln w="12700"/>
+        </p:spPr>
+        <p:style>
+          <a:lnRef idx="1">
+            <a:schemeClr val="dk1"/>
+          </a:lnRef>
+          <a:fillRef idx="0">
+            <a:schemeClr val="dk1"/>
+          </a:fillRef>
+          <a:effectRef idx="0">
+            <a:schemeClr val="dk1"/>
+          </a:effectRef>
+          <a:fontRef idx="minor">
+            <a:schemeClr val="tx1"/>
+          </a:fontRef>
+        </p:style>
+      </p:cxnSp>
+      <p:cxnSp>
+        <p:nvCxnSpPr>
+          <p:cNvPr id="143" name="Straight Connector 142">
+            <a:extLst>
+              <a:ext uri="{FF2B5EF4-FFF2-40B4-BE49-F238E27FC236}">
+                <a16:creationId xmlns:a16="http://schemas.microsoft.com/office/drawing/2014/main" id="{D87CED7F-F89E-4B26-B8B8-7B813440D283}"/>
+              </a:ext>
+            </a:extLst>
+          </p:cNvPr>
+          <p:cNvCxnSpPr>
+            <a:cxnSpLocks/>
+          </p:cNvCxnSpPr>
+          <p:nvPr/>
+        </p:nvCxnSpPr>
+        <p:spPr>
+          <a:xfrm flipH="1">
+            <a:off x="7023882" y="1155621"/>
+            <a:ext cx="73667" cy="91440"/>
+          </a:xfrm>
+          <a:prstGeom prst="line">
+            <a:avLst/>
+          </a:prstGeom>
+          <a:ln w="12700"/>
+        </p:spPr>
+        <p:style>
+          <a:lnRef idx="1">
+            <a:schemeClr val="dk1"/>
+          </a:lnRef>
+          <a:fillRef idx="0">
+            <a:schemeClr val="dk1"/>
+          </a:fillRef>
+          <a:effectRef idx="0">
+            <a:schemeClr val="dk1"/>
+          </a:effectRef>
+          <a:fontRef idx="minor">
+            <a:schemeClr val="tx1"/>
+          </a:fontRef>
+        </p:style>
+      </p:cxnSp>
+      <p:sp>
+        <p:nvSpPr>
+          <p:cNvPr id="144" name="TextBox 143">
+            <a:extLst>
+              <a:ext uri="{FF2B5EF4-FFF2-40B4-BE49-F238E27FC236}">
+                <a16:creationId xmlns:a16="http://schemas.microsoft.com/office/drawing/2014/main" id="{38E52CB5-D7E3-4A43-A59E-D4EA5063E386}"/>
+              </a:ext>
+            </a:extLst>
+          </p:cNvPr>
+          <p:cNvSpPr txBox="1"/>
+          <p:nvPr/>
+        </p:nvSpPr>
+        <p:spPr>
+          <a:xfrm>
+            <a:off x="5877845" y="7214314"/>
+            <a:ext cx="840999" cy="507831"/>
+          </a:xfrm>
+          <a:prstGeom prst="rect">
+            <a:avLst/>
+          </a:prstGeom>
+        </p:spPr>
+        <p:style>
+          <a:lnRef idx="2">
+            <a:schemeClr val="dk1"/>
+          </a:lnRef>
+          <a:fillRef idx="1">
+            <a:schemeClr val="lt1"/>
+          </a:fillRef>
+          <a:effectRef idx="0">
+            <a:schemeClr val="dk1"/>
+          </a:effectRef>
+          <a:fontRef idx="minor">
+            <a:schemeClr val="dk1"/>
+          </a:fontRef>
+        </p:style>
+        <p:txBody>
+          <a:bodyPr wrap="none" rtlCol="0">
+            <a:spAutoFit/>
+          </a:bodyPr>
+          <a:lstStyle/>
+          <a:p>
+            <a:pPr algn="ctr"/>
+            <a:r>
+              <a:rPr lang="en-US" sz="1600" dirty="0"/>
+              <a:t>Training</a:t>
+            </a:r>
+          </a:p>
+          <a:p>
+            <a:pPr algn="ctr"/>
+            <a:r>
+              <a:rPr lang="en-US" sz="1100" i="1" dirty="0"/>
+              <a:t>80%</a:t>
+            </a:r>
+          </a:p>
+        </p:txBody>
+      </p:sp>
+      <p:sp>
+        <p:nvSpPr>
+          <p:cNvPr id="146" name="TextBox 145">
+            <a:extLst>
+              <a:ext uri="{FF2B5EF4-FFF2-40B4-BE49-F238E27FC236}">
+                <a16:creationId xmlns:a16="http://schemas.microsoft.com/office/drawing/2014/main" id="{88251DA5-BF9B-40D8-A4E2-22B3E4E2E9BD}"/>
+              </a:ext>
+            </a:extLst>
+          </p:cNvPr>
+          <p:cNvSpPr txBox="1"/>
+          <p:nvPr/>
+        </p:nvSpPr>
+        <p:spPr>
+          <a:xfrm>
+            <a:off x="7265938" y="7214314"/>
+            <a:ext cx="765274" cy="507831"/>
+          </a:xfrm>
+          <a:prstGeom prst="rect">
+            <a:avLst/>
+          </a:prstGeom>
+        </p:spPr>
+        <p:style>
+          <a:lnRef idx="2">
+            <a:schemeClr val="dk1"/>
+          </a:lnRef>
+          <a:fillRef idx="1">
+            <a:schemeClr val="lt1"/>
+          </a:fillRef>
+          <a:effectRef idx="0">
+            <a:schemeClr val="dk1"/>
+          </a:effectRef>
+          <a:fontRef idx="minor">
+            <a:schemeClr val="dk1"/>
+          </a:fontRef>
+        </p:style>
+        <p:txBody>
+          <a:bodyPr wrap="none" rtlCol="0">
+            <a:spAutoFit/>
+          </a:bodyPr>
+          <a:lstStyle/>
+          <a:p>
+            <a:pPr algn="ctr"/>
+            <a:r>
+              <a:rPr lang="en-US" sz="1600" dirty="0"/>
+              <a:t>Testing</a:t>
+            </a:r>
+          </a:p>
+          <a:p>
+            <a:pPr algn="ctr"/>
+            <a:r>
+              <a:rPr lang="en-US" sz="1100" i="1" dirty="0"/>
+              <a:t>20%</a:t>
+            </a:r>
+            <a:endParaRPr lang="en-US" sz="1600" i="1" dirty="0"/>
+          </a:p>
+        </p:txBody>
+      </p:sp>
+      <p:cxnSp>
+        <p:nvCxnSpPr>
+          <p:cNvPr id="147" name="Straight Connector 146">
+            <a:extLst>
+              <a:ext uri="{FF2B5EF4-FFF2-40B4-BE49-F238E27FC236}">
+                <a16:creationId xmlns:a16="http://schemas.microsoft.com/office/drawing/2014/main" id="{2591BF91-23D0-496F-A8D0-1FC36E8E8225}"/>
+              </a:ext>
+            </a:extLst>
+          </p:cNvPr>
+          <p:cNvCxnSpPr>
+            <a:cxnSpLocks/>
+          </p:cNvCxnSpPr>
+          <p:nvPr/>
+        </p:nvCxnSpPr>
+        <p:spPr>
+          <a:xfrm>
+            <a:off x="6298345" y="6974914"/>
+            <a:ext cx="1350230" cy="0"/>
+          </a:xfrm>
+          <a:prstGeom prst="line">
+            <a:avLst/>
+          </a:prstGeom>
+          <a:ln w="12700"/>
+        </p:spPr>
+        <p:style>
+          <a:lnRef idx="1">
+            <a:schemeClr val="accent1"/>
+          </a:lnRef>
+          <a:fillRef idx="0">
+            <a:schemeClr val="accent1"/>
+          </a:fillRef>
+          <a:effectRef idx="0">
+            <a:schemeClr val="accent1"/>
+          </a:effectRef>
+          <a:fontRef idx="minor">
+            <a:schemeClr val="tx1"/>
+          </a:fontRef>
+        </p:style>
+      </p:cxnSp>
+      <p:cxnSp>
+        <p:nvCxnSpPr>
+          <p:cNvPr id="149" name="Straight Connector 148">
+            <a:extLst>
+              <a:ext uri="{FF2B5EF4-FFF2-40B4-BE49-F238E27FC236}">
+                <a16:creationId xmlns:a16="http://schemas.microsoft.com/office/drawing/2014/main" id="{3DBBC7D7-0C68-4833-83A5-FF87B1A630B7}"/>
+              </a:ext>
+            </a:extLst>
+          </p:cNvPr>
+          <p:cNvCxnSpPr>
+            <a:cxnSpLocks/>
+          </p:cNvCxnSpPr>
+          <p:nvPr/>
+        </p:nvCxnSpPr>
+        <p:spPr>
+          <a:xfrm>
+            <a:off x="6299182" y="6969863"/>
+            <a:ext cx="0" cy="244451"/>
+          </a:xfrm>
+          <a:prstGeom prst="line">
+            <a:avLst/>
+          </a:prstGeom>
+          <a:ln w="12700"/>
+        </p:spPr>
+        <p:style>
+          <a:lnRef idx="1">
+            <a:schemeClr val="accent1"/>
+          </a:lnRef>
+          <a:fillRef idx="0">
+            <a:schemeClr val="accent1"/>
+          </a:fillRef>
+          <a:effectRef idx="0">
+            <a:schemeClr val="accent1"/>
+          </a:effectRef>
+          <a:fontRef idx="minor">
+            <a:schemeClr val="tx1"/>
+          </a:fontRef>
+        </p:style>
+      </p:cxnSp>
+      <p:cxnSp>
+        <p:nvCxnSpPr>
+          <p:cNvPr id="152" name="Straight Connector 151">
+            <a:extLst>
+              <a:ext uri="{FF2B5EF4-FFF2-40B4-BE49-F238E27FC236}">
+                <a16:creationId xmlns:a16="http://schemas.microsoft.com/office/drawing/2014/main" id="{E21DDF37-6399-4ED0-B449-669E3680533B}"/>
+              </a:ext>
+            </a:extLst>
+          </p:cNvPr>
+          <p:cNvCxnSpPr>
+            <a:cxnSpLocks/>
+          </p:cNvCxnSpPr>
+          <p:nvPr/>
+        </p:nvCxnSpPr>
+        <p:spPr>
+          <a:xfrm>
+            <a:off x="7648575" y="6969863"/>
+            <a:ext cx="0" cy="244451"/>
+          </a:xfrm>
+          <a:prstGeom prst="line">
+            <a:avLst/>
+          </a:prstGeom>
+          <a:ln w="12700"/>
+        </p:spPr>
+        <p:style>
+          <a:lnRef idx="1">
+            <a:schemeClr val="accent1"/>
+          </a:lnRef>
+          <a:fillRef idx="0">
+            <a:schemeClr val="accent1"/>
+          </a:fillRef>
+          <a:effectRef idx="0">
+            <a:schemeClr val="accent1"/>
+          </a:effectRef>
+          <a:fontRef idx="minor">
+            <a:schemeClr val="tx1"/>
+          </a:fontRef>
+        </p:style>
+      </p:cxnSp>
+      <p:sp>
+        <p:nvSpPr>
+          <p:cNvPr id="153" name="TextBox 152">
+            <a:extLst>
+              <a:ext uri="{FF2B5EF4-FFF2-40B4-BE49-F238E27FC236}">
+                <a16:creationId xmlns:a16="http://schemas.microsoft.com/office/drawing/2014/main" id="{AA9CC673-3441-4FC2-97C4-D2F59D9C6881}"/>
+              </a:ext>
+            </a:extLst>
+          </p:cNvPr>
+          <p:cNvSpPr txBox="1"/>
+          <p:nvPr/>
+        </p:nvSpPr>
+        <p:spPr>
+          <a:xfrm>
+            <a:off x="8180938" y="6401095"/>
+            <a:ext cx="2227277" cy="507831"/>
+          </a:xfrm>
+          <a:prstGeom prst="rect">
+            <a:avLst/>
+          </a:prstGeom>
+        </p:spPr>
+        <p:style>
+          <a:lnRef idx="2">
+            <a:schemeClr val="dk1"/>
+          </a:lnRef>
+          <a:fillRef idx="1">
+            <a:schemeClr val="lt1"/>
+          </a:fillRef>
+          <a:effectRef idx="0">
+            <a:schemeClr val="dk1"/>
+          </a:effectRef>
+          <a:fontRef idx="minor">
+            <a:schemeClr val="dk1"/>
+          </a:fontRef>
+        </p:style>
+        <p:txBody>
+          <a:bodyPr wrap="none" rtlCol="0">
+            <a:spAutoFit/>
+          </a:bodyPr>
+          <a:lstStyle/>
+          <a:p>
+            <a:pPr algn="ctr"/>
+            <a:r>
+              <a:rPr lang="en-US" sz="1600" dirty="0"/>
+              <a:t>Background occurrences</a:t>
+            </a:r>
+          </a:p>
+          <a:p>
+            <a:pPr algn="ctr"/>
+            <a:r>
+              <a:rPr lang="en-US" sz="1100" i="1" dirty="0"/>
+              <a:t>10,000 OR same as occurrences</a:t>
+            </a:r>
+          </a:p>
+        </p:txBody>
+      </p:sp>
+      <p:cxnSp>
+        <p:nvCxnSpPr>
+          <p:cNvPr id="155" name="Straight Connector 154">
+            <a:extLst>
+              <a:ext uri="{FF2B5EF4-FFF2-40B4-BE49-F238E27FC236}">
+                <a16:creationId xmlns:a16="http://schemas.microsoft.com/office/drawing/2014/main" id="{7C87591C-E0AA-4356-B2DE-EBBCB38C27E7}"/>
+              </a:ext>
+            </a:extLst>
+          </p:cNvPr>
+          <p:cNvCxnSpPr>
+            <a:cxnSpLocks/>
+          </p:cNvCxnSpPr>
+          <p:nvPr/>
+        </p:nvCxnSpPr>
+        <p:spPr>
+          <a:xfrm>
+            <a:off x="6946874" y="6674751"/>
+            <a:ext cx="1227091" cy="0"/>
+          </a:xfrm>
+          <a:prstGeom prst="line">
+            <a:avLst/>
+          </a:prstGeom>
+          <a:ln w="12700"/>
+        </p:spPr>
+        <p:style>
+          <a:lnRef idx="1">
+            <a:schemeClr val="accent1"/>
+          </a:lnRef>
+          <a:fillRef idx="0">
+            <a:schemeClr val="accent1"/>
+          </a:fillRef>
+          <a:effectRef idx="0">
+            <a:schemeClr val="accent1"/>
+          </a:effectRef>
+          <a:fontRef idx="minor">
+            <a:schemeClr val="tx1"/>
+          </a:fontRef>
+        </p:style>
+      </p:cxnSp>
+      <p:cxnSp>
+        <p:nvCxnSpPr>
+          <p:cNvPr id="161" name="Straight Connector 160">
+            <a:extLst>
+              <a:ext uri="{FF2B5EF4-FFF2-40B4-BE49-F238E27FC236}">
+                <a16:creationId xmlns:a16="http://schemas.microsoft.com/office/drawing/2014/main" id="{146E65F1-EE88-4546-9B9D-B85F5C8E09DE}"/>
+              </a:ext>
+            </a:extLst>
+          </p:cNvPr>
+          <p:cNvCxnSpPr>
+            <a:cxnSpLocks/>
+          </p:cNvCxnSpPr>
+          <p:nvPr/>
+        </p:nvCxnSpPr>
+        <p:spPr>
+          <a:xfrm>
+            <a:off x="5322821" y="4387850"/>
+            <a:ext cx="0" cy="1060745"/>
+          </a:xfrm>
+          <a:prstGeom prst="line">
+            <a:avLst/>
+          </a:prstGeom>
+          <a:ln w="12700"/>
+        </p:spPr>
+        <p:style>
+          <a:lnRef idx="1">
+            <a:schemeClr val="accent1"/>
+          </a:lnRef>
+          <a:fillRef idx="0">
+            <a:schemeClr val="accent1"/>
+          </a:fillRef>
+          <a:effectRef idx="0">
+            <a:schemeClr val="accent1"/>
+          </a:effectRef>
+          <a:fontRef idx="minor">
+            <a:schemeClr val="tx1"/>
+          </a:fontRef>
+        </p:style>
+      </p:cxnSp>
+      <p:sp>
+        <p:nvSpPr>
+          <p:cNvPr id="163" name="TextBox 162">
+            <a:extLst>
+              <a:ext uri="{FF2B5EF4-FFF2-40B4-BE49-F238E27FC236}">
+                <a16:creationId xmlns:a16="http://schemas.microsoft.com/office/drawing/2014/main" id="{7ADBC4FA-FEE8-4A46-BF1E-DD4094D37E1B}"/>
+              </a:ext>
+            </a:extLst>
+          </p:cNvPr>
+          <p:cNvSpPr txBox="1"/>
+          <p:nvPr/>
+        </p:nvSpPr>
+        <p:spPr>
+          <a:xfrm>
+            <a:off x="4601888" y="5448595"/>
+            <a:ext cx="1484701" cy="507831"/>
+          </a:xfrm>
+          <a:prstGeom prst="rect">
+            <a:avLst/>
+          </a:prstGeom>
+        </p:spPr>
+        <p:style>
+          <a:lnRef idx="2">
+            <a:schemeClr val="dk1"/>
+          </a:lnRef>
+          <a:fillRef idx="1">
+            <a:schemeClr val="lt1"/>
+          </a:fillRef>
+          <a:effectRef idx="0">
+            <a:schemeClr val="dk1"/>
+          </a:effectRef>
+          <a:fontRef idx="minor">
+            <a:schemeClr val="dk1"/>
+          </a:fontRef>
+        </p:style>
+        <p:txBody>
+          <a:bodyPr wrap="none" rtlCol="0">
+            <a:spAutoFit/>
+          </a:bodyPr>
+          <a:lstStyle/>
+          <a:p>
+            <a:pPr algn="ctr"/>
+            <a:r>
+              <a:rPr lang="en-US" sz="1600" dirty="0"/>
+              <a:t>Species extent</a:t>
+            </a:r>
+          </a:p>
+          <a:p>
+            <a:pPr algn="ctr"/>
+            <a:r>
+              <a:rPr lang="en-US" sz="1100" i="1" dirty="0"/>
+              <a:t>&lt;100 km of occurrence</a:t>
+            </a:r>
+          </a:p>
+        </p:txBody>
+      </p:sp>
+      <p:cxnSp>
+        <p:nvCxnSpPr>
+          <p:cNvPr id="164" name="Straight Connector 163">
+            <a:extLst>
+              <a:ext uri="{FF2B5EF4-FFF2-40B4-BE49-F238E27FC236}">
+                <a16:creationId xmlns:a16="http://schemas.microsoft.com/office/drawing/2014/main" id="{5DB479E2-2A8A-453B-9B44-E73183C5F5E6}"/>
+              </a:ext>
+            </a:extLst>
+          </p:cNvPr>
+          <p:cNvCxnSpPr>
+            <a:cxnSpLocks/>
+          </p:cNvCxnSpPr>
+          <p:nvPr/>
+        </p:nvCxnSpPr>
+        <p:spPr>
+          <a:xfrm>
+            <a:off x="5321689" y="5123042"/>
+            <a:ext cx="584676" cy="0"/>
+          </a:xfrm>
+          <a:prstGeom prst="line">
+            <a:avLst/>
+          </a:prstGeom>
+          <a:ln w="12700"/>
+        </p:spPr>
+        <p:style>
+          <a:lnRef idx="1">
+            <a:schemeClr val="accent1"/>
+          </a:lnRef>
+          <a:fillRef idx="0">
+            <a:schemeClr val="accent1"/>
+          </a:fillRef>
+          <a:effectRef idx="0">
+            <a:schemeClr val="accent1"/>
+          </a:effectRef>
+          <a:fontRef idx="minor">
+            <a:schemeClr val="tx1"/>
+          </a:fontRef>
+        </p:style>
+      </p:cxnSp>
+      <p:sp>
+        <p:nvSpPr>
+          <p:cNvPr id="167" name="TextBox 166">
+            <a:extLst>
+              <a:ext uri="{FF2B5EF4-FFF2-40B4-BE49-F238E27FC236}">
+                <a16:creationId xmlns:a16="http://schemas.microsoft.com/office/drawing/2014/main" id="{BCF29E63-5E64-4342-B9D4-E6B809B24D18}"/>
+              </a:ext>
+            </a:extLst>
+          </p:cNvPr>
+          <p:cNvSpPr txBox="1"/>
+          <p:nvPr/>
+        </p:nvSpPr>
+        <p:spPr>
+          <a:xfrm>
+            <a:off x="8763994" y="5455217"/>
+            <a:ext cx="994183" cy="507831"/>
+          </a:xfrm>
+          <a:prstGeom prst="rect">
+            <a:avLst/>
+          </a:prstGeom>
+        </p:spPr>
+        <p:style>
+          <a:lnRef idx="2">
+            <a:schemeClr val="dk1"/>
+          </a:lnRef>
+          <a:fillRef idx="1">
+            <a:schemeClr val="lt1"/>
+          </a:fillRef>
+          <a:effectRef idx="0">
+            <a:schemeClr val="dk1"/>
+          </a:effectRef>
+          <a:fontRef idx="minor">
+            <a:schemeClr val="dk1"/>
+          </a:fontRef>
+        </p:style>
+        <p:txBody>
+          <a:bodyPr wrap="none" rtlCol="0">
+            <a:spAutoFit/>
+          </a:bodyPr>
+          <a:lstStyle/>
+          <a:p>
+            <a:pPr algn="ctr"/>
+            <a:r>
+              <a:rPr lang="en-US" sz="1600" dirty="0"/>
+              <a:t>Crop</a:t>
+            </a:r>
+          </a:p>
+          <a:p>
+            <a:pPr algn="ctr"/>
+            <a:r>
+              <a:rPr lang="en-US" sz="1100" i="1" dirty="0"/>
+              <a:t>Species extent</a:t>
+            </a:r>
+          </a:p>
+        </p:txBody>
+      </p:sp>
+      <p:cxnSp>
+        <p:nvCxnSpPr>
+          <p:cNvPr id="171" name="Straight Connector 170">
+            <a:extLst>
+              <a:ext uri="{FF2B5EF4-FFF2-40B4-BE49-F238E27FC236}">
+                <a16:creationId xmlns:a16="http://schemas.microsoft.com/office/drawing/2014/main" id="{D4514AAB-B9A3-42BD-BDC9-F2677BF5B5A7}"/>
+              </a:ext>
+            </a:extLst>
+          </p:cNvPr>
+          <p:cNvCxnSpPr>
+            <a:cxnSpLocks/>
+            <a:endCxn id="153" idx="0"/>
+          </p:cNvCxnSpPr>
+          <p:nvPr/>
+        </p:nvCxnSpPr>
+        <p:spPr>
+          <a:xfrm>
+            <a:off x="9291165" y="5963048"/>
+            <a:ext cx="3412" cy="438047"/>
+          </a:xfrm>
+          <a:prstGeom prst="line">
+            <a:avLst/>
+          </a:prstGeom>
+          <a:ln w="12700"/>
+        </p:spPr>
+        <p:style>
+          <a:lnRef idx="1">
+            <a:schemeClr val="accent1"/>
+          </a:lnRef>
+          <a:fillRef idx="0">
+            <a:schemeClr val="accent1"/>
+          </a:fillRef>
+          <a:effectRef idx="0">
+            <a:schemeClr val="accent1"/>
+          </a:effectRef>
+          <a:fontRef idx="minor">
+            <a:schemeClr val="tx1"/>
+          </a:fontRef>
+        </p:style>
+      </p:cxnSp>
+      <p:sp>
+        <p:nvSpPr>
+          <p:cNvPr id="176" name="Rectangle 175">
+            <a:extLst>
+              <a:ext uri="{FF2B5EF4-FFF2-40B4-BE49-F238E27FC236}">
+                <a16:creationId xmlns:a16="http://schemas.microsoft.com/office/drawing/2014/main" id="{048C21EF-71F8-48EB-8805-9FE08DC26F19}"/>
+              </a:ext>
+            </a:extLst>
+          </p:cNvPr>
+          <p:cNvSpPr/>
+          <p:nvPr/>
+        </p:nvSpPr>
+        <p:spPr>
+          <a:xfrm>
+            <a:off x="6859690" y="5645357"/>
+            <a:ext cx="205690" cy="140595"/>
+          </a:xfrm>
+          <a:prstGeom prst="rect">
+            <a:avLst/>
+          </a:prstGeom>
+          <a:solidFill>
+            <a:schemeClr val="bg1"/>
+          </a:solidFill>
+          <a:ln>
+            <a:noFill/>
+          </a:ln>
+        </p:spPr>
+        <p:style>
+          <a:lnRef idx="2">
+            <a:schemeClr val="accent1">
+              <a:shade val="50000"/>
+            </a:schemeClr>
+          </a:lnRef>
+          <a:fillRef idx="1">
+            <a:schemeClr val="accent1"/>
+          </a:fillRef>
+          <a:effectRef idx="0">
+            <a:schemeClr val="accent1"/>
+          </a:effectRef>
+          <a:fontRef idx="minor">
+            <a:schemeClr val="lt1"/>
+          </a:fontRef>
+        </p:style>
+        <p:txBody>
+          <a:bodyPr rtlCol="0" anchor="ctr"/>
+          <a:lstStyle/>
+          <a:p>
+            <a:pPr algn="ctr"/>
+            <a:endParaRPr lang="en-US"/>
+          </a:p>
+        </p:txBody>
+      </p:sp>
+      <p:cxnSp>
+        <p:nvCxnSpPr>
+          <p:cNvPr id="177" name="Straight Connector 176">
+            <a:extLst>
+              <a:ext uri="{FF2B5EF4-FFF2-40B4-BE49-F238E27FC236}">
+                <a16:creationId xmlns:a16="http://schemas.microsoft.com/office/drawing/2014/main" id="{B43ECA00-B718-45FA-B48C-FD28B8F41AF9}"/>
+              </a:ext>
+            </a:extLst>
+          </p:cNvPr>
+          <p:cNvCxnSpPr>
+            <a:cxnSpLocks/>
+          </p:cNvCxnSpPr>
+          <p:nvPr/>
+        </p:nvCxnSpPr>
+        <p:spPr>
+          <a:xfrm flipH="1">
+            <a:off x="6823971" y="5667503"/>
+            <a:ext cx="73667" cy="91440"/>
+          </a:xfrm>
+          <a:prstGeom prst="line">
+            <a:avLst/>
+          </a:prstGeom>
+          <a:ln w="12700"/>
+        </p:spPr>
+        <p:style>
+          <a:lnRef idx="1">
+            <a:schemeClr val="dk1"/>
+          </a:lnRef>
+          <a:fillRef idx="0">
+            <a:schemeClr val="dk1"/>
+          </a:fillRef>
+          <a:effectRef idx="0">
+            <a:schemeClr val="dk1"/>
+          </a:effectRef>
+          <a:fontRef idx="minor">
+            <a:schemeClr val="tx1"/>
+          </a:fontRef>
+        </p:style>
+      </p:cxnSp>
+      <p:cxnSp>
+        <p:nvCxnSpPr>
+          <p:cNvPr id="178" name="Straight Connector 177">
+            <a:extLst>
+              <a:ext uri="{FF2B5EF4-FFF2-40B4-BE49-F238E27FC236}">
+                <a16:creationId xmlns:a16="http://schemas.microsoft.com/office/drawing/2014/main" id="{58D2334E-15D0-47A1-A8A4-BC4C78ED1B0D}"/>
+              </a:ext>
+            </a:extLst>
+          </p:cNvPr>
+          <p:cNvCxnSpPr>
+            <a:cxnSpLocks/>
+          </p:cNvCxnSpPr>
+          <p:nvPr/>
+        </p:nvCxnSpPr>
+        <p:spPr>
+          <a:xfrm flipH="1">
+            <a:off x="7027952" y="5667503"/>
+            <a:ext cx="73667" cy="91440"/>
+          </a:xfrm>
+          <a:prstGeom prst="line">
+            <a:avLst/>
+          </a:prstGeom>
+          <a:ln w="12700"/>
+        </p:spPr>
+        <p:style>
+          <a:lnRef idx="1">
+            <a:schemeClr val="dk1"/>
+          </a:lnRef>
+          <a:fillRef idx="0">
+            <a:schemeClr val="dk1"/>
+          </a:fillRef>
+          <a:effectRef idx="0">
+            <a:schemeClr val="dk1"/>
+          </a:effectRef>
+          <a:fontRef idx="minor">
+            <a:schemeClr val="tx1"/>
+          </a:fontRef>
+        </p:style>
+      </p:cxnSp>
+      <p:cxnSp>
+        <p:nvCxnSpPr>
+          <p:cNvPr id="145" name="Straight Connector 144">
+            <a:extLst>
+              <a:ext uri="{FF2B5EF4-FFF2-40B4-BE49-F238E27FC236}">
+                <a16:creationId xmlns:a16="http://schemas.microsoft.com/office/drawing/2014/main" id="{AB3B3822-25CA-49E0-898D-E0279438A5B3}"/>
+              </a:ext>
+            </a:extLst>
+          </p:cNvPr>
+          <p:cNvCxnSpPr>
+            <a:cxnSpLocks/>
+            <a:stCxn id="125" idx="2"/>
+          </p:cNvCxnSpPr>
+          <p:nvPr/>
+        </p:nvCxnSpPr>
+        <p:spPr>
+          <a:xfrm>
+            <a:off x="6946875" y="5376958"/>
+            <a:ext cx="4884" cy="1598093"/>
+          </a:xfrm>
+          <a:prstGeom prst="line">
+            <a:avLst/>
+          </a:prstGeom>
+          <a:ln w="12700"/>
+        </p:spPr>
+        <p:style>
+          <a:lnRef idx="1">
+            <a:schemeClr val="accent1"/>
+          </a:lnRef>
+          <a:fillRef idx="0">
+            <a:schemeClr val="accent1"/>
+          </a:fillRef>
+          <a:effectRef idx="0">
+            <a:schemeClr val="accent1"/>
+          </a:effectRef>
+          <a:fontRef idx="minor">
+            <a:schemeClr val="tx1"/>
+          </a:fontRef>
+        </p:style>
+      </p:cxnSp>
+      <p:cxnSp>
+        <p:nvCxnSpPr>
+          <p:cNvPr id="180" name="Straight Connector 179">
+            <a:extLst>
+              <a:ext uri="{FF2B5EF4-FFF2-40B4-BE49-F238E27FC236}">
+                <a16:creationId xmlns:a16="http://schemas.microsoft.com/office/drawing/2014/main" id="{98E159AC-B7DE-4C8A-B850-C75095B2EA45}"/>
+              </a:ext>
+            </a:extLst>
+          </p:cNvPr>
+          <p:cNvCxnSpPr>
+            <a:cxnSpLocks/>
+          </p:cNvCxnSpPr>
+          <p:nvPr/>
+        </p:nvCxnSpPr>
+        <p:spPr>
+          <a:xfrm>
+            <a:off x="1946030" y="4426762"/>
+            <a:ext cx="19374" cy="3052557"/>
+          </a:xfrm>
+          <a:prstGeom prst="line">
+            <a:avLst/>
+          </a:prstGeom>
+          <a:ln w="12700"/>
+        </p:spPr>
+        <p:style>
+          <a:lnRef idx="1">
+            <a:schemeClr val="accent1"/>
+          </a:lnRef>
+          <a:fillRef idx="0">
+            <a:schemeClr val="accent1"/>
+          </a:fillRef>
+          <a:effectRef idx="0">
+            <a:schemeClr val="accent1"/>
+          </a:effectRef>
+          <a:fontRef idx="minor">
+            <a:schemeClr val="tx1"/>
+          </a:fontRef>
+        </p:style>
+      </p:cxnSp>
+      <p:cxnSp>
+        <p:nvCxnSpPr>
+          <p:cNvPr id="182" name="Straight Connector 181">
+            <a:extLst>
+              <a:ext uri="{FF2B5EF4-FFF2-40B4-BE49-F238E27FC236}">
+                <a16:creationId xmlns:a16="http://schemas.microsoft.com/office/drawing/2014/main" id="{75E60663-1C63-4411-AED5-08046F9B07F9}"/>
+              </a:ext>
+            </a:extLst>
+          </p:cNvPr>
+          <p:cNvCxnSpPr>
+            <a:cxnSpLocks/>
+          </p:cNvCxnSpPr>
+          <p:nvPr/>
+        </p:nvCxnSpPr>
+        <p:spPr>
+          <a:xfrm>
+            <a:off x="5381735" y="7468230"/>
+            <a:ext cx="496110" cy="0"/>
+          </a:xfrm>
+          <a:prstGeom prst="line">
+            <a:avLst/>
+          </a:prstGeom>
+          <a:ln w="12700"/>
+        </p:spPr>
+        <p:style>
+          <a:lnRef idx="1">
+            <a:schemeClr val="accent1"/>
+          </a:lnRef>
+          <a:fillRef idx="0">
+            <a:schemeClr val="accent1"/>
+          </a:fillRef>
+          <a:effectRef idx="0">
+            <a:schemeClr val="accent1"/>
+          </a:effectRef>
+          <a:fontRef idx="minor">
+            <a:schemeClr val="tx1"/>
+          </a:fontRef>
+        </p:style>
+      </p:cxnSp>
+      <p:sp>
+        <p:nvSpPr>
+          <p:cNvPr id="183" name="TextBox 182">
+            <a:extLst>
+              <a:ext uri="{FF2B5EF4-FFF2-40B4-BE49-F238E27FC236}">
+                <a16:creationId xmlns:a16="http://schemas.microsoft.com/office/drawing/2014/main" id="{A2A39B9C-98FC-419D-9948-6413ED6D8BE3}"/>
+              </a:ext>
+            </a:extLst>
+          </p:cNvPr>
+          <p:cNvSpPr txBox="1"/>
+          <p:nvPr/>
+        </p:nvSpPr>
+        <p:spPr>
+          <a:xfrm>
+            <a:off x="3838733" y="7227525"/>
+            <a:ext cx="1561645" cy="507831"/>
+          </a:xfrm>
+          <a:prstGeom prst="rect">
+            <a:avLst/>
+          </a:prstGeom>
+        </p:spPr>
+        <p:style>
+          <a:lnRef idx="2">
+            <a:schemeClr val="dk1"/>
+          </a:lnRef>
+          <a:fillRef idx="1">
+            <a:schemeClr val="lt1"/>
+          </a:fillRef>
+          <a:effectRef idx="0">
+            <a:schemeClr val="dk1"/>
+          </a:effectRef>
+          <a:fontRef idx="minor">
+            <a:schemeClr val="dk1"/>
+          </a:fontRef>
+        </p:style>
+        <p:txBody>
+          <a:bodyPr wrap="none" rtlCol="0">
+            <a:spAutoFit/>
+          </a:bodyPr>
+          <a:lstStyle/>
+          <a:p>
+            <a:pPr algn="ctr"/>
+            <a:r>
+              <a:rPr lang="en-US" sz="1600" dirty="0"/>
+              <a:t>Extract climate</a:t>
+            </a:r>
+          </a:p>
+          <a:p>
+            <a:pPr algn="ctr"/>
+            <a:r>
+              <a:rPr lang="en-US" sz="1100" i="1" dirty="0"/>
+              <a:t>Occurrence/background</a:t>
+            </a:r>
+          </a:p>
+        </p:txBody>
+      </p:sp>
+      <p:cxnSp>
+        <p:nvCxnSpPr>
+          <p:cNvPr id="191" name="Straight Connector 190">
+            <a:extLst>
+              <a:ext uri="{FF2B5EF4-FFF2-40B4-BE49-F238E27FC236}">
+                <a16:creationId xmlns:a16="http://schemas.microsoft.com/office/drawing/2014/main" id="{2E5E8E40-3784-43E7-A801-D4BC8C2585A2}"/>
+              </a:ext>
+            </a:extLst>
+          </p:cNvPr>
+          <p:cNvCxnSpPr>
+            <a:cxnSpLocks/>
+          </p:cNvCxnSpPr>
+          <p:nvPr/>
+        </p:nvCxnSpPr>
+        <p:spPr>
+          <a:xfrm>
+            <a:off x="1968890" y="7479319"/>
+            <a:ext cx="0" cy="4074503"/>
+          </a:xfrm>
+          <a:prstGeom prst="line">
+            <a:avLst/>
+          </a:prstGeom>
+          <a:ln w="12700"/>
+        </p:spPr>
+        <p:style>
+          <a:lnRef idx="1">
+            <a:schemeClr val="accent1"/>
+          </a:lnRef>
+          <a:fillRef idx="0">
+            <a:schemeClr val="accent1"/>
+          </a:fillRef>
+          <a:effectRef idx="0">
+            <a:schemeClr val="accent1"/>
+          </a:effectRef>
+          <a:fontRef idx="minor">
+            <a:schemeClr val="tx1"/>
+          </a:fontRef>
+        </p:style>
+      </p:cxnSp>
+      <p:sp>
+        <p:nvSpPr>
+          <p:cNvPr id="193" name="TextBox 192">
+            <a:extLst>
+              <a:ext uri="{FF2B5EF4-FFF2-40B4-BE49-F238E27FC236}">
+                <a16:creationId xmlns:a16="http://schemas.microsoft.com/office/drawing/2014/main" id="{47DBE3DC-BD45-4B04-9B13-4B0A248B296F}"/>
+              </a:ext>
+            </a:extLst>
+          </p:cNvPr>
+          <p:cNvSpPr txBox="1"/>
+          <p:nvPr/>
+        </p:nvSpPr>
+        <p:spPr>
+          <a:xfrm>
+            <a:off x="3824967" y="8244143"/>
+            <a:ext cx="1651286" cy="507831"/>
+          </a:xfrm>
+          <a:prstGeom prst="rect">
+            <a:avLst/>
+          </a:prstGeom>
+        </p:spPr>
+        <p:style>
+          <a:lnRef idx="2">
+            <a:schemeClr val="dk1"/>
+          </a:lnRef>
+          <a:fillRef idx="1">
+            <a:schemeClr val="lt1"/>
+          </a:fillRef>
+          <a:effectRef idx="0">
+            <a:schemeClr val="dk1"/>
+          </a:effectRef>
+          <a:fontRef idx="minor">
+            <a:schemeClr val="dk1"/>
+          </a:fontRef>
+        </p:style>
+        <p:txBody>
+          <a:bodyPr wrap="none" rtlCol="0">
+            <a:spAutoFit/>
+          </a:bodyPr>
+          <a:lstStyle/>
+          <a:p>
+            <a:pPr algn="ctr"/>
+            <a:r>
+              <a:rPr lang="en-US" sz="1600" dirty="0"/>
+              <a:t>Check collinearity</a:t>
+            </a:r>
+          </a:p>
+          <a:p>
+            <a:pPr algn="ctr"/>
+            <a:r>
+              <a:rPr lang="en-US" sz="1100" i="1" dirty="0"/>
+              <a:t>Variance inflation factor</a:t>
+            </a:r>
+          </a:p>
+        </p:txBody>
+      </p:sp>
+      <p:cxnSp>
+        <p:nvCxnSpPr>
+          <p:cNvPr id="194" name="Straight Connector 193">
+            <a:extLst>
+              <a:ext uri="{FF2B5EF4-FFF2-40B4-BE49-F238E27FC236}">
+                <a16:creationId xmlns:a16="http://schemas.microsoft.com/office/drawing/2014/main" id="{BF16E3DF-085B-4135-8E5B-0FC6E32A3A57}"/>
+              </a:ext>
+            </a:extLst>
+          </p:cNvPr>
+          <p:cNvCxnSpPr>
+            <a:cxnSpLocks/>
+          </p:cNvCxnSpPr>
+          <p:nvPr/>
+        </p:nvCxnSpPr>
+        <p:spPr>
+          <a:xfrm>
+            <a:off x="4675329" y="9688056"/>
+            <a:ext cx="0" cy="469355"/>
+          </a:xfrm>
+          <a:prstGeom prst="line">
+            <a:avLst/>
+          </a:prstGeom>
+          <a:ln w="12700"/>
+        </p:spPr>
+        <p:style>
+          <a:lnRef idx="1">
+            <a:schemeClr val="accent1"/>
+          </a:lnRef>
+          <a:fillRef idx="0">
+            <a:schemeClr val="accent1"/>
+          </a:fillRef>
+          <a:effectRef idx="0">
+            <a:schemeClr val="accent1"/>
+          </a:effectRef>
+          <a:fontRef idx="minor">
+            <a:schemeClr val="tx1"/>
+          </a:fontRef>
+        </p:style>
+      </p:cxnSp>
+      <p:sp>
+        <p:nvSpPr>
+          <p:cNvPr id="195" name="TextBox 194">
+            <a:extLst>
+              <a:ext uri="{FF2B5EF4-FFF2-40B4-BE49-F238E27FC236}">
+                <a16:creationId xmlns:a16="http://schemas.microsoft.com/office/drawing/2014/main" id="{AE646AC4-8873-4D73-A048-76505A786D79}"/>
+              </a:ext>
+            </a:extLst>
+          </p:cNvPr>
+          <p:cNvSpPr txBox="1"/>
+          <p:nvPr/>
+        </p:nvSpPr>
+        <p:spPr>
+          <a:xfrm>
+            <a:off x="5936522" y="9344837"/>
+            <a:ext cx="1561645" cy="507831"/>
+          </a:xfrm>
+          <a:prstGeom prst="rect">
+            <a:avLst/>
+          </a:prstGeom>
+        </p:spPr>
+        <p:style>
+          <a:lnRef idx="2">
+            <a:schemeClr val="dk1"/>
+          </a:lnRef>
+          <a:fillRef idx="1">
+            <a:schemeClr val="lt1"/>
+          </a:fillRef>
+          <a:effectRef idx="0">
+            <a:schemeClr val="dk1"/>
+          </a:effectRef>
+          <a:fontRef idx="minor">
+            <a:schemeClr val="dk1"/>
+          </a:fontRef>
+        </p:style>
+        <p:txBody>
+          <a:bodyPr wrap="none" rtlCol="0">
+            <a:spAutoFit/>
+          </a:bodyPr>
+          <a:lstStyle/>
+          <a:p>
+            <a:pPr algn="ctr"/>
+            <a:r>
+              <a:rPr lang="en-US" sz="1600" dirty="0"/>
+              <a:t>Model selection</a:t>
+            </a:r>
+          </a:p>
+          <a:p>
+            <a:pPr algn="ctr"/>
+            <a:r>
+              <a:rPr lang="en-US" sz="1100" i="1" dirty="0"/>
+              <a:t>Lowest AICc</a:t>
+            </a:r>
+          </a:p>
+        </p:txBody>
+      </p:sp>
+      <p:sp>
+        <p:nvSpPr>
+          <p:cNvPr id="196" name="TextBox 195">
+            <a:extLst>
+              <a:ext uri="{FF2B5EF4-FFF2-40B4-BE49-F238E27FC236}">
+                <a16:creationId xmlns:a16="http://schemas.microsoft.com/office/drawing/2014/main" id="{800C0B9D-36AC-494C-997B-EE73EAB5F53D}"/>
+              </a:ext>
+            </a:extLst>
+          </p:cNvPr>
+          <p:cNvSpPr txBox="1"/>
+          <p:nvPr/>
+        </p:nvSpPr>
+        <p:spPr>
+          <a:xfrm>
+            <a:off x="4134455" y="9339017"/>
+            <a:ext cx="1021433" cy="507831"/>
+          </a:xfrm>
+          <a:prstGeom prst="rect">
+            <a:avLst/>
+          </a:prstGeom>
+        </p:spPr>
+        <p:style>
+          <a:lnRef idx="2">
+            <a:schemeClr val="dk1"/>
+          </a:lnRef>
+          <a:fillRef idx="1">
+            <a:schemeClr val="lt1"/>
+          </a:fillRef>
+          <a:effectRef idx="0">
+            <a:schemeClr val="dk1"/>
+          </a:effectRef>
+          <a:fontRef idx="minor">
+            <a:schemeClr val="dk1"/>
+          </a:fontRef>
+        </p:style>
+        <p:txBody>
+          <a:bodyPr wrap="none" rtlCol="0">
+            <a:spAutoFit/>
+          </a:bodyPr>
+          <a:lstStyle/>
+          <a:p>
+            <a:pPr algn="ctr"/>
+            <a:r>
+              <a:rPr lang="en-US" sz="1600" dirty="0"/>
+              <a:t>MaxEnt</a:t>
+            </a:r>
+          </a:p>
+          <a:p>
+            <a:pPr algn="ctr"/>
+            <a:r>
+              <a:rPr lang="en-US" sz="1100" i="1" dirty="0"/>
+              <a:t>48 parameters</a:t>
+            </a:r>
+          </a:p>
+        </p:txBody>
+      </p:sp>
+      <p:sp>
+        <p:nvSpPr>
+          <p:cNvPr id="197" name="TextBox 196">
+            <a:extLst>
+              <a:ext uri="{FF2B5EF4-FFF2-40B4-BE49-F238E27FC236}">
+                <a16:creationId xmlns:a16="http://schemas.microsoft.com/office/drawing/2014/main" id="{4CC91095-EAFA-40CB-9EB2-5A019CA18FAF}"/>
+              </a:ext>
+            </a:extLst>
+          </p:cNvPr>
+          <p:cNvSpPr txBox="1"/>
+          <p:nvPr/>
+        </p:nvSpPr>
+        <p:spPr>
+          <a:xfrm>
+            <a:off x="7148698" y="10346054"/>
+            <a:ext cx="1050159" cy="338554"/>
+          </a:xfrm>
+          <a:prstGeom prst="rect">
+            <a:avLst/>
+          </a:prstGeom>
+        </p:spPr>
+        <p:style>
+          <a:lnRef idx="2">
+            <a:schemeClr val="dk1"/>
+          </a:lnRef>
+          <a:fillRef idx="1">
+            <a:schemeClr val="lt1"/>
+          </a:fillRef>
+          <a:effectRef idx="0">
+            <a:schemeClr val="dk1"/>
+          </a:effectRef>
+          <a:fontRef idx="minor">
+            <a:schemeClr val="dk1"/>
+          </a:fontRef>
+        </p:style>
+        <p:txBody>
+          <a:bodyPr wrap="none" rtlCol="0">
+            <a:spAutoFit/>
+          </a:bodyPr>
+          <a:lstStyle/>
+          <a:p>
+            <a:pPr algn="ctr"/>
+            <a:r>
+              <a:rPr lang="en-US" sz="1600" dirty="0"/>
+              <a:t>Evaluation</a:t>
+            </a:r>
+          </a:p>
+        </p:txBody>
+      </p:sp>
+      <p:sp>
+        <p:nvSpPr>
+          <p:cNvPr id="202" name="TextBox 201">
+            <a:extLst>
+              <a:ext uri="{FF2B5EF4-FFF2-40B4-BE49-F238E27FC236}">
+                <a16:creationId xmlns:a16="http://schemas.microsoft.com/office/drawing/2014/main" id="{3A5444EC-03F5-4D50-91F5-5CF818BFA8C0}"/>
+              </a:ext>
+            </a:extLst>
+          </p:cNvPr>
+          <p:cNvSpPr txBox="1"/>
+          <p:nvPr/>
+        </p:nvSpPr>
+        <p:spPr>
+          <a:xfrm>
+            <a:off x="5255308" y="9404473"/>
+            <a:ext cx="574196" cy="261610"/>
+          </a:xfrm>
+          <a:prstGeom prst="rect">
+            <a:avLst/>
+          </a:prstGeom>
+          <a:noFill/>
+        </p:spPr>
+        <p:txBody>
+          <a:bodyPr wrap="square" rtlCol="0">
+            <a:spAutoFit/>
+          </a:bodyPr>
+          <a:lstStyle/>
+          <a:p>
+            <a:r>
+              <a:rPr lang="en-US" sz="1100" i="1" dirty="0"/>
+              <a:t>Tuning</a:t>
+            </a:r>
+          </a:p>
+        </p:txBody>
+      </p:sp>
+      <p:sp>
+        <p:nvSpPr>
+          <p:cNvPr id="210" name="TextBox 209">
+            <a:extLst>
+              <a:ext uri="{FF2B5EF4-FFF2-40B4-BE49-F238E27FC236}">
+                <a16:creationId xmlns:a16="http://schemas.microsoft.com/office/drawing/2014/main" id="{1F00DED5-A63D-46C8-AC77-26204DD72EEC}"/>
+              </a:ext>
+            </a:extLst>
+          </p:cNvPr>
+          <p:cNvSpPr txBox="1"/>
+          <p:nvPr/>
+        </p:nvSpPr>
+        <p:spPr>
+          <a:xfrm>
+            <a:off x="338537" y="11128793"/>
+            <a:ext cx="962123" cy="369332"/>
+          </a:xfrm>
+          <a:prstGeom prst="rect">
+            <a:avLst/>
+          </a:prstGeom>
+          <a:noFill/>
+        </p:spPr>
+        <p:txBody>
+          <a:bodyPr wrap="none" rtlCol="0">
+            <a:spAutoFit/>
+          </a:bodyPr>
+          <a:lstStyle/>
+          <a:p>
+            <a:r>
+              <a:rPr lang="en-US" b="1" dirty="0"/>
+              <a:t>Outputs</a:t>
+            </a:r>
+            <a:endParaRPr lang="en-US" i="1" dirty="0"/>
+          </a:p>
+        </p:txBody>
+      </p:sp>
+      <p:sp>
+        <p:nvSpPr>
+          <p:cNvPr id="211" name="TextBox 210">
+            <a:extLst>
+              <a:ext uri="{FF2B5EF4-FFF2-40B4-BE49-F238E27FC236}">
+                <a16:creationId xmlns:a16="http://schemas.microsoft.com/office/drawing/2014/main" id="{999A403A-C89B-41FE-858E-D88C2DB9A2BD}"/>
+              </a:ext>
+            </a:extLst>
+          </p:cNvPr>
+          <p:cNvSpPr txBox="1"/>
+          <p:nvPr/>
+        </p:nvSpPr>
+        <p:spPr>
+          <a:xfrm>
+            <a:off x="329231" y="619809"/>
+            <a:ext cx="989886" cy="646331"/>
+          </a:xfrm>
+          <a:prstGeom prst="rect">
+            <a:avLst/>
+          </a:prstGeom>
+          <a:noFill/>
+        </p:spPr>
+        <p:txBody>
+          <a:bodyPr wrap="none" rtlCol="0">
+            <a:spAutoFit/>
+          </a:bodyPr>
+          <a:lstStyle/>
+          <a:p>
+            <a:r>
+              <a:rPr lang="en-US" b="1" dirty="0"/>
+              <a:t>Initialize</a:t>
+            </a:r>
+          </a:p>
+          <a:p>
+            <a:r>
+              <a:rPr lang="en-US" i="1" dirty="0"/>
+              <a:t>Serial</a:t>
+            </a:r>
+          </a:p>
+        </p:txBody>
+      </p:sp>
+      <p:sp>
+        <p:nvSpPr>
+          <p:cNvPr id="215" name="TextBox 214">
+            <a:extLst>
+              <a:ext uri="{FF2B5EF4-FFF2-40B4-BE49-F238E27FC236}">
+                <a16:creationId xmlns:a16="http://schemas.microsoft.com/office/drawing/2014/main" id="{430E3AD2-F7A9-4188-943F-867164A8A008}"/>
+              </a:ext>
+            </a:extLst>
+          </p:cNvPr>
+          <p:cNvSpPr txBox="1"/>
+          <p:nvPr/>
+        </p:nvSpPr>
+        <p:spPr>
+          <a:xfrm>
+            <a:off x="6403713" y="11540743"/>
+            <a:ext cx="2465740" cy="507831"/>
+          </a:xfrm>
+          <a:prstGeom prst="rect">
+            <a:avLst/>
+          </a:prstGeom>
+        </p:spPr>
+        <p:style>
+          <a:lnRef idx="2">
+            <a:schemeClr val="dk1"/>
+          </a:lnRef>
+          <a:fillRef idx="1">
+            <a:schemeClr val="lt1"/>
+          </a:fillRef>
+          <a:effectRef idx="0">
+            <a:schemeClr val="dk1"/>
+          </a:effectRef>
+          <a:fontRef idx="minor">
+            <a:schemeClr val="dk1"/>
+          </a:fontRef>
+        </p:style>
+        <p:txBody>
+          <a:bodyPr wrap="none" rtlCol="0">
+            <a:spAutoFit/>
+          </a:bodyPr>
+          <a:lstStyle/>
+          <a:p>
+            <a:pPr algn="ctr"/>
+            <a:r>
+              <a:rPr lang="en-US" sz="1600" dirty="0"/>
+              <a:t>Model Evaluation</a:t>
+            </a:r>
+          </a:p>
+          <a:p>
+            <a:pPr algn="ctr"/>
+            <a:r>
+              <a:rPr lang="en-US" sz="1100" i="1" dirty="0"/>
+              <a:t>AUC, R2, TPR, TNR, Variable importance</a:t>
+            </a:r>
+            <a:endParaRPr lang="en-US" sz="1600" i="1" dirty="0"/>
+          </a:p>
+        </p:txBody>
+      </p:sp>
+      <p:sp>
+        <p:nvSpPr>
+          <p:cNvPr id="220" name="TextBox 219">
+            <a:extLst>
+              <a:ext uri="{FF2B5EF4-FFF2-40B4-BE49-F238E27FC236}">
+                <a16:creationId xmlns:a16="http://schemas.microsoft.com/office/drawing/2014/main" id="{010A15D9-B541-4235-A76F-5238DA12E739}"/>
+              </a:ext>
+            </a:extLst>
+          </p:cNvPr>
+          <p:cNvSpPr txBox="1"/>
+          <p:nvPr/>
+        </p:nvSpPr>
+        <p:spPr>
+          <a:xfrm>
+            <a:off x="3212892" y="9988134"/>
+            <a:ext cx="771879" cy="338554"/>
+          </a:xfrm>
+          <a:prstGeom prst="rect">
+            <a:avLst/>
+          </a:prstGeom>
+        </p:spPr>
+        <p:style>
+          <a:lnRef idx="2">
+            <a:schemeClr val="dk1"/>
+          </a:lnRef>
+          <a:fillRef idx="1">
+            <a:schemeClr val="lt1"/>
+          </a:fillRef>
+          <a:effectRef idx="0">
+            <a:schemeClr val="dk1"/>
+          </a:effectRef>
+          <a:fontRef idx="minor">
+            <a:schemeClr val="dk1"/>
+          </a:fontRef>
+        </p:style>
+        <p:txBody>
+          <a:bodyPr wrap="none" rtlCol="0">
+            <a:spAutoFit/>
+          </a:bodyPr>
+          <a:lstStyle/>
+          <a:p>
+            <a:pPr algn="ctr"/>
+            <a:r>
+              <a:rPr lang="en-US" sz="1600" dirty="0"/>
+              <a:t>Predict</a:t>
+            </a:r>
+          </a:p>
+        </p:txBody>
+      </p:sp>
+      <p:cxnSp>
+        <p:nvCxnSpPr>
+          <p:cNvPr id="231" name="Straight Connector 230">
+            <a:extLst>
+              <a:ext uri="{FF2B5EF4-FFF2-40B4-BE49-F238E27FC236}">
+                <a16:creationId xmlns:a16="http://schemas.microsoft.com/office/drawing/2014/main" id="{5E526AEE-0D47-448C-A0BF-6DE817D6DA61}"/>
+              </a:ext>
+            </a:extLst>
+          </p:cNvPr>
+          <p:cNvCxnSpPr>
+            <a:cxnSpLocks/>
+          </p:cNvCxnSpPr>
+          <p:nvPr/>
+        </p:nvCxnSpPr>
+        <p:spPr>
+          <a:xfrm flipH="1">
+            <a:off x="3588484" y="10326688"/>
+            <a:ext cx="822" cy="1261266"/>
+          </a:xfrm>
+          <a:prstGeom prst="line">
+            <a:avLst/>
+          </a:prstGeom>
+          <a:ln w="12700"/>
+        </p:spPr>
+        <p:style>
+          <a:lnRef idx="1">
+            <a:schemeClr val="accent1"/>
+          </a:lnRef>
+          <a:fillRef idx="0">
+            <a:schemeClr val="accent1"/>
+          </a:fillRef>
+          <a:effectRef idx="0">
+            <a:schemeClr val="accent1"/>
+          </a:effectRef>
+          <a:fontRef idx="minor">
+            <a:schemeClr val="tx1"/>
+          </a:fontRef>
+        </p:style>
+      </p:cxnSp>
+      <p:sp>
+        <p:nvSpPr>
+          <p:cNvPr id="236" name="TextBox 235">
+            <a:extLst>
+              <a:ext uri="{FF2B5EF4-FFF2-40B4-BE49-F238E27FC236}">
+                <a16:creationId xmlns:a16="http://schemas.microsoft.com/office/drawing/2014/main" id="{33B4EB67-E715-4FDE-83C0-C10D0E9B9CB5}"/>
+              </a:ext>
+            </a:extLst>
+          </p:cNvPr>
+          <p:cNvSpPr txBox="1"/>
+          <p:nvPr/>
+        </p:nvSpPr>
+        <p:spPr>
+          <a:xfrm>
+            <a:off x="3128382" y="11553822"/>
+            <a:ext cx="1883849" cy="507831"/>
+          </a:xfrm>
+          <a:prstGeom prst="rect">
+            <a:avLst/>
+          </a:prstGeom>
+        </p:spPr>
+        <p:style>
+          <a:lnRef idx="2">
+            <a:schemeClr val="dk1"/>
+          </a:lnRef>
+          <a:fillRef idx="1">
+            <a:schemeClr val="lt1"/>
+          </a:fillRef>
+          <a:effectRef idx="0">
+            <a:schemeClr val="dk1"/>
+          </a:effectRef>
+          <a:fontRef idx="minor">
+            <a:schemeClr val="dk1"/>
+          </a:fontRef>
+        </p:style>
+        <p:txBody>
+          <a:bodyPr wrap="none" rtlCol="0">
+            <a:spAutoFit/>
+          </a:bodyPr>
+          <a:lstStyle/>
+          <a:p>
+            <a:pPr algn="ctr"/>
+            <a:r>
+              <a:rPr lang="en-US" sz="1600" dirty="0"/>
+              <a:t>Future climate</a:t>
+            </a:r>
+          </a:p>
+          <a:p>
+            <a:pPr algn="ctr"/>
+            <a:r>
+              <a:rPr lang="en-US" sz="1100" i="1" dirty="0"/>
+              <a:t>6 climate models for each city</a:t>
+            </a:r>
+            <a:endParaRPr lang="en-US" sz="1600" i="1" dirty="0"/>
+          </a:p>
+        </p:txBody>
+      </p:sp>
+      <p:cxnSp>
+        <p:nvCxnSpPr>
+          <p:cNvPr id="237" name="Straight Connector 236">
+            <a:extLst>
+              <a:ext uri="{FF2B5EF4-FFF2-40B4-BE49-F238E27FC236}">
+                <a16:creationId xmlns:a16="http://schemas.microsoft.com/office/drawing/2014/main" id="{A28E4BD1-8665-42D5-894E-FF5D58172DC7}"/>
+              </a:ext>
+            </a:extLst>
+          </p:cNvPr>
+          <p:cNvCxnSpPr>
+            <a:cxnSpLocks/>
+          </p:cNvCxnSpPr>
+          <p:nvPr/>
+        </p:nvCxnSpPr>
+        <p:spPr>
+          <a:xfrm>
+            <a:off x="10738086" y="4432300"/>
+            <a:ext cx="0" cy="5725111"/>
+          </a:xfrm>
+          <a:prstGeom prst="line">
+            <a:avLst/>
+          </a:prstGeom>
+          <a:ln w="12700"/>
+        </p:spPr>
+        <p:style>
+          <a:lnRef idx="1">
+            <a:schemeClr val="accent1"/>
+          </a:lnRef>
+          <a:fillRef idx="0">
+            <a:schemeClr val="accent1"/>
+          </a:fillRef>
+          <a:effectRef idx="0">
+            <a:schemeClr val="accent1"/>
+          </a:effectRef>
+          <a:fontRef idx="minor">
+            <a:schemeClr val="tx1"/>
+          </a:fontRef>
+        </p:style>
+      </p:cxnSp>
+      <p:cxnSp>
+        <p:nvCxnSpPr>
+          <p:cNvPr id="240" name="Straight Connector 239">
+            <a:extLst>
+              <a:ext uri="{FF2B5EF4-FFF2-40B4-BE49-F238E27FC236}">
+                <a16:creationId xmlns:a16="http://schemas.microsoft.com/office/drawing/2014/main" id="{1D298032-3A95-4989-BDEA-10C7B12FE4CF}"/>
+              </a:ext>
+            </a:extLst>
+          </p:cNvPr>
+          <p:cNvCxnSpPr>
+            <a:cxnSpLocks/>
+          </p:cNvCxnSpPr>
+          <p:nvPr/>
+        </p:nvCxnSpPr>
+        <p:spPr>
+          <a:xfrm>
+            <a:off x="3984771" y="10157411"/>
+            <a:ext cx="6753315" cy="0"/>
+          </a:xfrm>
+          <a:prstGeom prst="line">
+            <a:avLst/>
+          </a:prstGeom>
+          <a:ln w="12700"/>
+        </p:spPr>
+        <p:style>
+          <a:lnRef idx="1">
+            <a:schemeClr val="accent1"/>
+          </a:lnRef>
+          <a:fillRef idx="0">
+            <a:schemeClr val="accent1"/>
+          </a:fillRef>
+          <a:effectRef idx="0">
+            <a:schemeClr val="accent1"/>
+          </a:effectRef>
+          <a:fontRef idx="minor">
+            <a:schemeClr val="tx1"/>
+          </a:fontRef>
+        </p:style>
+      </p:cxnSp>
+      <p:sp>
+        <p:nvSpPr>
+          <p:cNvPr id="246" name="TextBox 245">
+            <a:extLst>
+              <a:ext uri="{FF2B5EF4-FFF2-40B4-BE49-F238E27FC236}">
+                <a16:creationId xmlns:a16="http://schemas.microsoft.com/office/drawing/2014/main" id="{2839FFC0-8907-4BE3-8A4D-DCB9B09DDF84}"/>
+              </a:ext>
+            </a:extLst>
+          </p:cNvPr>
+          <p:cNvSpPr txBox="1"/>
+          <p:nvPr/>
+        </p:nvSpPr>
+        <p:spPr>
+          <a:xfrm>
+            <a:off x="1525454" y="11558527"/>
+            <a:ext cx="1474378" cy="507831"/>
+          </a:xfrm>
+          <a:prstGeom prst="rect">
+            <a:avLst/>
+          </a:prstGeom>
+        </p:spPr>
+        <p:style>
+          <a:lnRef idx="2">
+            <a:schemeClr val="dk1"/>
+          </a:lnRef>
+          <a:fillRef idx="1">
+            <a:schemeClr val="lt1"/>
+          </a:fillRef>
+          <a:effectRef idx="0">
+            <a:schemeClr val="dk1"/>
+          </a:effectRef>
+          <a:fontRef idx="minor">
+            <a:schemeClr val="dk1"/>
+          </a:fontRef>
+        </p:style>
+        <p:txBody>
+          <a:bodyPr wrap="none" rtlCol="0">
+            <a:spAutoFit/>
+          </a:bodyPr>
+          <a:lstStyle/>
+          <a:p>
+            <a:pPr algn="ctr"/>
+            <a:r>
+              <a:rPr lang="en-US" sz="1600" dirty="0"/>
+              <a:t>Current climate</a:t>
+            </a:r>
+          </a:p>
+          <a:p>
+            <a:pPr algn="ctr"/>
+            <a:r>
+              <a:rPr lang="en-US" sz="1100" i="1" dirty="0"/>
+              <a:t>For each city</a:t>
+            </a:r>
+            <a:endParaRPr lang="en-US" sz="1600" i="1" dirty="0"/>
+          </a:p>
+        </p:txBody>
+      </p:sp>
+      <p:cxnSp>
+        <p:nvCxnSpPr>
+          <p:cNvPr id="251" name="Straight Connector 250">
+            <a:extLst>
+              <a:ext uri="{FF2B5EF4-FFF2-40B4-BE49-F238E27FC236}">
+                <a16:creationId xmlns:a16="http://schemas.microsoft.com/office/drawing/2014/main" id="{108F27F8-B1BE-4F34-AA13-584EA1B47B9D}"/>
+              </a:ext>
+            </a:extLst>
+          </p:cNvPr>
+          <p:cNvCxnSpPr>
+            <a:cxnSpLocks/>
+          </p:cNvCxnSpPr>
+          <p:nvPr/>
+        </p:nvCxnSpPr>
+        <p:spPr>
+          <a:xfrm>
+            <a:off x="1973892" y="7468229"/>
+            <a:ext cx="1852545" cy="0"/>
+          </a:xfrm>
+          <a:prstGeom prst="line">
+            <a:avLst/>
+          </a:prstGeom>
+          <a:ln w="12700"/>
+        </p:spPr>
+        <p:style>
+          <a:lnRef idx="1">
+            <a:schemeClr val="accent1"/>
+          </a:lnRef>
+          <a:fillRef idx="0">
+            <a:schemeClr val="accent1"/>
+          </a:fillRef>
+          <a:effectRef idx="0">
+            <a:schemeClr val="accent1"/>
+          </a:effectRef>
+          <a:fontRef idx="minor">
+            <a:schemeClr val="tx1"/>
+          </a:fontRef>
+        </p:style>
+      </p:cxnSp>
+      <p:sp>
+        <p:nvSpPr>
+          <p:cNvPr id="259" name="Rectangle 258">
+            <a:extLst>
+              <a:ext uri="{FF2B5EF4-FFF2-40B4-BE49-F238E27FC236}">
+                <a16:creationId xmlns:a16="http://schemas.microsoft.com/office/drawing/2014/main" id="{430DB199-7EFD-4ACB-AE20-F339FC0B5256}"/>
+              </a:ext>
+            </a:extLst>
+          </p:cNvPr>
+          <p:cNvSpPr/>
+          <p:nvPr/>
+        </p:nvSpPr>
+        <p:spPr>
+          <a:xfrm>
+            <a:off x="3473673" y="7388424"/>
+            <a:ext cx="205690" cy="140595"/>
+          </a:xfrm>
+          <a:prstGeom prst="rect">
+            <a:avLst/>
+          </a:prstGeom>
+          <a:solidFill>
+            <a:schemeClr val="bg1"/>
+          </a:solidFill>
+          <a:ln>
+            <a:noFill/>
+          </a:ln>
+        </p:spPr>
+        <p:style>
+          <a:lnRef idx="2">
+            <a:schemeClr val="accent1">
+              <a:shade val="50000"/>
+            </a:schemeClr>
+          </a:lnRef>
+          <a:fillRef idx="1">
+            <a:schemeClr val="accent1"/>
+          </a:fillRef>
+          <a:effectRef idx="0">
+            <a:schemeClr val="accent1"/>
+          </a:effectRef>
+          <a:fontRef idx="minor">
+            <a:schemeClr val="lt1"/>
+          </a:fontRef>
+        </p:style>
+        <p:txBody>
+          <a:bodyPr rtlCol="0" anchor="ctr"/>
+          <a:lstStyle/>
+          <a:p>
+            <a:pPr algn="ctr"/>
+            <a:endParaRPr lang="en-US"/>
+          </a:p>
+        </p:txBody>
+      </p:sp>
+      <p:cxnSp>
+        <p:nvCxnSpPr>
+          <p:cNvPr id="260" name="Straight Connector 259">
+            <a:extLst>
+              <a:ext uri="{FF2B5EF4-FFF2-40B4-BE49-F238E27FC236}">
+                <a16:creationId xmlns:a16="http://schemas.microsoft.com/office/drawing/2014/main" id="{C0EB10C1-B341-4A45-9D1D-DE5F6C249F20}"/>
+              </a:ext>
+            </a:extLst>
+          </p:cNvPr>
+          <p:cNvCxnSpPr>
+            <a:cxnSpLocks/>
+          </p:cNvCxnSpPr>
+          <p:nvPr/>
+        </p:nvCxnSpPr>
+        <p:spPr>
+          <a:xfrm flipH="1">
+            <a:off x="3437954" y="7410570"/>
+            <a:ext cx="73667" cy="91440"/>
+          </a:xfrm>
+          <a:prstGeom prst="line">
+            <a:avLst/>
+          </a:prstGeom>
+          <a:ln w="12700"/>
+        </p:spPr>
+        <p:style>
+          <a:lnRef idx="1">
+            <a:schemeClr val="dk1"/>
+          </a:lnRef>
+          <a:fillRef idx="0">
+            <a:schemeClr val="dk1"/>
+          </a:fillRef>
+          <a:effectRef idx="0">
+            <a:schemeClr val="dk1"/>
+          </a:effectRef>
+          <a:fontRef idx="minor">
+            <a:schemeClr val="tx1"/>
+          </a:fontRef>
+        </p:style>
+      </p:cxnSp>
+      <p:cxnSp>
+        <p:nvCxnSpPr>
+          <p:cNvPr id="261" name="Straight Connector 260">
+            <a:extLst>
+              <a:ext uri="{FF2B5EF4-FFF2-40B4-BE49-F238E27FC236}">
+                <a16:creationId xmlns:a16="http://schemas.microsoft.com/office/drawing/2014/main" id="{C3BC4003-B0B0-4050-AE8E-5EFE0DDB165C}"/>
+              </a:ext>
+            </a:extLst>
+          </p:cNvPr>
+          <p:cNvCxnSpPr>
+            <a:cxnSpLocks/>
+          </p:cNvCxnSpPr>
+          <p:nvPr/>
+        </p:nvCxnSpPr>
+        <p:spPr>
+          <a:xfrm flipH="1">
+            <a:off x="3641935" y="7410570"/>
+            <a:ext cx="73667" cy="91440"/>
+          </a:xfrm>
+          <a:prstGeom prst="line">
+            <a:avLst/>
+          </a:prstGeom>
+          <a:ln w="12700"/>
+        </p:spPr>
+        <p:style>
+          <a:lnRef idx="1">
+            <a:schemeClr val="dk1"/>
+          </a:lnRef>
+          <a:fillRef idx="0">
+            <a:schemeClr val="dk1"/>
+          </a:fillRef>
+          <a:effectRef idx="0">
+            <a:schemeClr val="dk1"/>
+          </a:effectRef>
+          <a:fontRef idx="minor">
+            <a:schemeClr val="tx1"/>
+          </a:fontRef>
+        </p:style>
+      </p:cxnSp>
+      <p:cxnSp>
+        <p:nvCxnSpPr>
+          <p:cNvPr id="223" name="Straight Connector 222">
+            <a:extLst>
+              <a:ext uri="{FF2B5EF4-FFF2-40B4-BE49-F238E27FC236}">
+                <a16:creationId xmlns:a16="http://schemas.microsoft.com/office/drawing/2014/main" id="{49630729-A85D-4C97-985B-CBB755D813F1}"/>
+              </a:ext>
+            </a:extLst>
+          </p:cNvPr>
+          <p:cNvCxnSpPr>
+            <a:cxnSpLocks/>
+          </p:cNvCxnSpPr>
+          <p:nvPr/>
+        </p:nvCxnSpPr>
+        <p:spPr>
+          <a:xfrm>
+            <a:off x="3579250" y="4429133"/>
+            <a:ext cx="0" cy="5555986"/>
+          </a:xfrm>
+          <a:prstGeom prst="line">
+            <a:avLst/>
+          </a:prstGeom>
+          <a:ln w="12700"/>
+        </p:spPr>
+        <p:style>
+          <a:lnRef idx="1">
+            <a:schemeClr val="accent1"/>
+          </a:lnRef>
+          <a:fillRef idx="0">
+            <a:schemeClr val="accent1"/>
+          </a:fillRef>
+          <a:effectRef idx="0">
+            <a:schemeClr val="accent1"/>
+          </a:effectRef>
+          <a:fontRef idx="minor">
+            <a:schemeClr val="tx1"/>
+          </a:fontRef>
+        </p:style>
+      </p:cxnSp>
+      <p:cxnSp>
+        <p:nvCxnSpPr>
+          <p:cNvPr id="263" name="Straight Connector 262">
+            <a:extLst>
+              <a:ext uri="{FF2B5EF4-FFF2-40B4-BE49-F238E27FC236}">
+                <a16:creationId xmlns:a16="http://schemas.microsoft.com/office/drawing/2014/main" id="{A60489EE-1BD3-4D65-B79E-14AD9FCFD4D6}"/>
+              </a:ext>
+            </a:extLst>
+          </p:cNvPr>
+          <p:cNvCxnSpPr>
+            <a:cxnSpLocks/>
+          </p:cNvCxnSpPr>
+          <p:nvPr/>
+        </p:nvCxnSpPr>
+        <p:spPr>
+          <a:xfrm>
+            <a:off x="5194082" y="9630214"/>
+            <a:ext cx="731520" cy="0"/>
+          </a:xfrm>
+          <a:prstGeom prst="line">
+            <a:avLst/>
+          </a:prstGeom>
+          <a:ln w="12700">
+            <a:headEnd type="arrow"/>
+            <a:tailEnd type="arrow"/>
+          </a:ln>
+        </p:spPr>
+        <p:style>
+          <a:lnRef idx="1">
+            <a:schemeClr val="accent1"/>
+          </a:lnRef>
+          <a:fillRef idx="0">
+            <a:schemeClr val="accent1"/>
+          </a:fillRef>
+          <a:effectRef idx="0">
+            <a:schemeClr val="accent1"/>
+          </a:effectRef>
+          <a:fontRef idx="minor">
+            <a:schemeClr val="tx1"/>
+          </a:fontRef>
+        </p:style>
+      </p:cxnSp>
+      <p:sp>
+        <p:nvSpPr>
+          <p:cNvPr id="267" name="TextBox 266">
+            <a:extLst>
+              <a:ext uri="{FF2B5EF4-FFF2-40B4-BE49-F238E27FC236}">
+                <a16:creationId xmlns:a16="http://schemas.microsoft.com/office/drawing/2014/main" id="{B271B8DD-A7D0-4ECA-BE09-B4E3BD6CDBD8}"/>
+              </a:ext>
+            </a:extLst>
+          </p:cNvPr>
+          <p:cNvSpPr txBox="1"/>
+          <p:nvPr/>
+        </p:nvSpPr>
+        <p:spPr>
+          <a:xfrm>
+            <a:off x="1550022" y="9988134"/>
+            <a:ext cx="771879" cy="338554"/>
+          </a:xfrm>
+          <a:prstGeom prst="rect">
+            <a:avLst/>
+          </a:prstGeom>
+        </p:spPr>
+        <p:style>
+          <a:lnRef idx="2">
+            <a:schemeClr val="dk1"/>
+          </a:lnRef>
+          <a:fillRef idx="1">
+            <a:schemeClr val="lt1"/>
+          </a:fillRef>
+          <a:effectRef idx="0">
+            <a:schemeClr val="dk1"/>
+          </a:effectRef>
+          <a:fontRef idx="minor">
+            <a:schemeClr val="dk1"/>
+          </a:fontRef>
+        </p:style>
+        <p:txBody>
+          <a:bodyPr wrap="none" rtlCol="0">
+            <a:spAutoFit/>
+          </a:bodyPr>
+          <a:lstStyle/>
+          <a:p>
+            <a:pPr algn="ctr"/>
+            <a:r>
+              <a:rPr lang="en-US" sz="1600" dirty="0"/>
+              <a:t>Predict</a:t>
+            </a:r>
+          </a:p>
+        </p:txBody>
+      </p:sp>
+      <p:cxnSp>
+        <p:nvCxnSpPr>
+          <p:cNvPr id="272" name="Straight Connector 271">
+            <a:extLst>
+              <a:ext uri="{FF2B5EF4-FFF2-40B4-BE49-F238E27FC236}">
+                <a16:creationId xmlns:a16="http://schemas.microsoft.com/office/drawing/2014/main" id="{DE7EA755-601F-4C03-B924-997282D4562C}"/>
+              </a:ext>
+            </a:extLst>
+          </p:cNvPr>
+          <p:cNvCxnSpPr>
+            <a:cxnSpLocks/>
+            <a:endCxn id="220" idx="1"/>
+          </p:cNvCxnSpPr>
+          <p:nvPr/>
+        </p:nvCxnSpPr>
+        <p:spPr>
+          <a:xfrm>
+            <a:off x="2318330" y="10157411"/>
+            <a:ext cx="894562" cy="0"/>
+          </a:xfrm>
+          <a:prstGeom prst="line">
+            <a:avLst/>
+          </a:prstGeom>
+          <a:ln w="12700"/>
+        </p:spPr>
+        <p:style>
+          <a:lnRef idx="1">
+            <a:schemeClr val="accent1"/>
+          </a:lnRef>
+          <a:fillRef idx="0">
+            <a:schemeClr val="accent1"/>
+          </a:fillRef>
+          <a:effectRef idx="0">
+            <a:schemeClr val="accent1"/>
+          </a:effectRef>
+          <a:fontRef idx="minor">
+            <a:schemeClr val="tx1"/>
+          </a:fontRef>
+        </p:style>
+      </p:cxnSp>
+      <p:cxnSp>
+        <p:nvCxnSpPr>
+          <p:cNvPr id="82" name="Straight Connector 81">
+            <a:extLst>
+              <a:ext uri="{FF2B5EF4-FFF2-40B4-BE49-F238E27FC236}">
+                <a16:creationId xmlns:a16="http://schemas.microsoft.com/office/drawing/2014/main" id="{DD552C58-CD8C-4347-8DA7-2038863A7DEF}"/>
+              </a:ext>
+            </a:extLst>
+          </p:cNvPr>
+          <p:cNvCxnSpPr>
+            <a:cxnSpLocks/>
+          </p:cNvCxnSpPr>
+          <p:nvPr/>
+        </p:nvCxnSpPr>
+        <p:spPr>
+          <a:xfrm>
+            <a:off x="1268289" y="4385310"/>
+            <a:ext cx="10618911" cy="0"/>
+          </a:xfrm>
+          <a:prstGeom prst="line">
+            <a:avLst/>
+          </a:prstGeom>
+          <a:ln w="38100"/>
+        </p:spPr>
+        <p:style>
+          <a:lnRef idx="1">
+            <a:schemeClr val="accent2"/>
+          </a:lnRef>
+          <a:fillRef idx="0">
+            <a:schemeClr val="accent2"/>
+          </a:fillRef>
+          <a:effectRef idx="0">
+            <a:schemeClr val="accent2"/>
+          </a:effectRef>
+          <a:fontRef idx="minor">
+            <a:schemeClr val="tx1"/>
+          </a:fontRef>
+        </p:style>
+      </p:cxnSp>
+      <p:cxnSp>
+        <p:nvCxnSpPr>
+          <p:cNvPr id="212" name="Straight Connector 211">
+            <a:extLst>
+              <a:ext uri="{FF2B5EF4-FFF2-40B4-BE49-F238E27FC236}">
+                <a16:creationId xmlns:a16="http://schemas.microsoft.com/office/drawing/2014/main" id="{CA415451-D9A7-40E4-A0EC-30737A6C997F}"/>
+              </a:ext>
+            </a:extLst>
+          </p:cNvPr>
+          <p:cNvCxnSpPr>
+            <a:cxnSpLocks/>
+          </p:cNvCxnSpPr>
+          <p:nvPr/>
+        </p:nvCxnSpPr>
+        <p:spPr>
+          <a:xfrm>
+            <a:off x="1322745" y="802082"/>
+            <a:ext cx="10564455" cy="0"/>
+          </a:xfrm>
+          <a:prstGeom prst="line">
+            <a:avLst/>
+          </a:prstGeom>
+          <a:ln w="38100"/>
+        </p:spPr>
+        <p:style>
+          <a:lnRef idx="1">
+            <a:schemeClr val="accent2"/>
+          </a:lnRef>
+          <a:fillRef idx="0">
+            <a:schemeClr val="accent2"/>
+          </a:fillRef>
+          <a:effectRef idx="0">
+            <a:schemeClr val="accent2"/>
+          </a:effectRef>
+          <a:fontRef idx="minor">
+            <a:schemeClr val="tx1"/>
+          </a:fontRef>
+        </p:style>
+      </p:cxnSp>
+      <p:cxnSp>
+        <p:nvCxnSpPr>
+          <p:cNvPr id="209" name="Straight Connector 208">
+            <a:extLst>
+              <a:ext uri="{FF2B5EF4-FFF2-40B4-BE49-F238E27FC236}">
+                <a16:creationId xmlns:a16="http://schemas.microsoft.com/office/drawing/2014/main" id="{A2D9DFF2-9587-4BE8-9C6D-BACAA5AE69E6}"/>
+              </a:ext>
+            </a:extLst>
+          </p:cNvPr>
+          <p:cNvCxnSpPr>
+            <a:cxnSpLocks/>
+          </p:cNvCxnSpPr>
+          <p:nvPr/>
+        </p:nvCxnSpPr>
+        <p:spPr>
+          <a:xfrm>
+            <a:off x="1322745" y="11313459"/>
+            <a:ext cx="10564455" cy="0"/>
+          </a:xfrm>
+          <a:prstGeom prst="line">
+            <a:avLst/>
+          </a:prstGeom>
+          <a:ln w="38100"/>
+        </p:spPr>
+        <p:style>
+          <a:lnRef idx="1">
+            <a:schemeClr val="accent2"/>
+          </a:lnRef>
+          <a:fillRef idx="0">
+            <a:schemeClr val="accent2"/>
+          </a:fillRef>
+          <a:effectRef idx="0">
+            <a:schemeClr val="accent2"/>
+          </a:effectRef>
+          <a:fontRef idx="minor">
+            <a:schemeClr val="tx1"/>
+          </a:fontRef>
+        </p:style>
+      </p:cxnSp>
+      <p:cxnSp>
+        <p:nvCxnSpPr>
+          <p:cNvPr id="117" name="Straight Connector 116">
+            <a:extLst>
+              <a:ext uri="{FF2B5EF4-FFF2-40B4-BE49-F238E27FC236}">
+                <a16:creationId xmlns:a16="http://schemas.microsoft.com/office/drawing/2014/main" id="{CEA1A8AC-3BE7-4BB7-993F-CC82EE7DF65D}"/>
+              </a:ext>
+            </a:extLst>
+          </p:cNvPr>
+          <p:cNvCxnSpPr>
+            <a:cxnSpLocks/>
+            <a:endCxn id="109" idx="1"/>
+          </p:cNvCxnSpPr>
+          <p:nvPr/>
+        </p:nvCxnSpPr>
+        <p:spPr>
+          <a:xfrm>
+            <a:off x="5313320" y="3182042"/>
+            <a:ext cx="797096" cy="0"/>
+          </a:xfrm>
+          <a:prstGeom prst="line">
+            <a:avLst/>
+          </a:prstGeom>
+          <a:ln w="12700"/>
+        </p:spPr>
+        <p:style>
+          <a:lnRef idx="1">
+            <a:schemeClr val="accent1"/>
+          </a:lnRef>
+          <a:fillRef idx="0">
+            <a:schemeClr val="accent1"/>
+          </a:fillRef>
+          <a:effectRef idx="0">
+            <a:schemeClr val="accent1"/>
+          </a:effectRef>
+          <a:fontRef idx="minor">
+            <a:schemeClr val="tx1"/>
+          </a:fontRef>
+        </p:style>
+      </p:cxnSp>
+    </p:spTree>
+    <p:extLst>
+      <p:ext uri="{BB962C8B-B14F-4D97-AF65-F5344CB8AC3E}">
+        <p14:creationId xmlns:p14="http://schemas.microsoft.com/office/powerpoint/2010/main" val="2758041553"/>
       </p:ext>
     </p:extLst>
   </p:cSld>

</xml_diff>

<commit_message>
revised new analyses for figures and publication
</commit_message>
<xml_diff>
--- a/CodingWorkflow.pptx
+++ b/CodingWorkflow.pptx
@@ -244,7 +244,7 @@
           <a:p>
             <a:fld id="{9D97B504-67CE-45BE-ADD0-830AC3C59E05}" type="datetimeFigureOut">
               <a:rPr lang="en-US" smtClean="0"/>
-              <a:t>6/2/2021</a:t>
+              <a:t>7/8/2021</a:t>
             </a:fld>
             <a:endParaRPr lang="en-US"/>
           </a:p>
@@ -414,7 +414,7 @@
           <a:p>
             <a:fld id="{9D97B504-67CE-45BE-ADD0-830AC3C59E05}" type="datetimeFigureOut">
               <a:rPr lang="en-US" smtClean="0"/>
-              <a:t>6/2/2021</a:t>
+              <a:t>7/8/2021</a:t>
             </a:fld>
             <a:endParaRPr lang="en-US"/>
           </a:p>
@@ -594,7 +594,7 @@
           <a:p>
             <a:fld id="{9D97B504-67CE-45BE-ADD0-830AC3C59E05}" type="datetimeFigureOut">
               <a:rPr lang="en-US" smtClean="0"/>
-              <a:t>6/2/2021</a:t>
+              <a:t>7/8/2021</a:t>
             </a:fld>
             <a:endParaRPr lang="en-US"/>
           </a:p>
@@ -764,7 +764,7 @@
           <a:p>
             <a:fld id="{9D97B504-67CE-45BE-ADD0-830AC3C59E05}" type="datetimeFigureOut">
               <a:rPr lang="en-US" smtClean="0"/>
-              <a:t>6/2/2021</a:t>
+              <a:t>7/8/2021</a:t>
             </a:fld>
             <a:endParaRPr lang="en-US"/>
           </a:p>
@@ -1008,7 +1008,7 @@
           <a:p>
             <a:fld id="{9D97B504-67CE-45BE-ADD0-830AC3C59E05}" type="datetimeFigureOut">
               <a:rPr lang="en-US" smtClean="0"/>
-              <a:t>6/2/2021</a:t>
+              <a:t>7/8/2021</a:t>
             </a:fld>
             <a:endParaRPr lang="en-US"/>
           </a:p>
@@ -1240,7 +1240,7 @@
           <a:p>
             <a:fld id="{9D97B504-67CE-45BE-ADD0-830AC3C59E05}" type="datetimeFigureOut">
               <a:rPr lang="en-US" smtClean="0"/>
-              <a:t>6/2/2021</a:t>
+              <a:t>7/8/2021</a:t>
             </a:fld>
             <a:endParaRPr lang="en-US"/>
           </a:p>
@@ -1607,7 +1607,7 @@
           <a:p>
             <a:fld id="{9D97B504-67CE-45BE-ADD0-830AC3C59E05}" type="datetimeFigureOut">
               <a:rPr lang="en-US" smtClean="0"/>
-              <a:t>6/2/2021</a:t>
+              <a:t>7/8/2021</a:t>
             </a:fld>
             <a:endParaRPr lang="en-US"/>
           </a:p>
@@ -1725,7 +1725,7 @@
           <a:p>
             <a:fld id="{9D97B504-67CE-45BE-ADD0-830AC3C59E05}" type="datetimeFigureOut">
               <a:rPr lang="en-US" smtClean="0"/>
-              <a:t>6/2/2021</a:t>
+              <a:t>7/8/2021</a:t>
             </a:fld>
             <a:endParaRPr lang="en-US"/>
           </a:p>
@@ -1820,7 +1820,7 @@
           <a:p>
             <a:fld id="{9D97B504-67CE-45BE-ADD0-830AC3C59E05}" type="datetimeFigureOut">
               <a:rPr lang="en-US" smtClean="0"/>
-              <a:t>6/2/2021</a:t>
+              <a:t>7/8/2021</a:t>
             </a:fld>
             <a:endParaRPr lang="en-US"/>
           </a:p>
@@ -2097,7 +2097,7 @@
           <a:p>
             <a:fld id="{9D97B504-67CE-45BE-ADD0-830AC3C59E05}" type="datetimeFigureOut">
               <a:rPr lang="en-US" smtClean="0"/>
-              <a:t>6/2/2021</a:t>
+              <a:t>7/8/2021</a:t>
             </a:fld>
             <a:endParaRPr lang="en-US"/>
           </a:p>
@@ -2354,7 +2354,7 @@
           <a:p>
             <a:fld id="{9D97B504-67CE-45BE-ADD0-830AC3C59E05}" type="datetimeFigureOut">
               <a:rPr lang="en-US" smtClean="0"/>
-              <a:t>6/2/2021</a:t>
+              <a:t>7/8/2021</a:t>
             </a:fld>
             <a:endParaRPr lang="en-US"/>
           </a:p>
@@ -2567,7 +2567,7 @@
           <a:p>
             <a:fld id="{9D97B504-67CE-45BE-ADD0-830AC3C59E05}" type="datetimeFigureOut">
               <a:rPr lang="en-US" smtClean="0"/>
-              <a:t>6/2/2021</a:t>
+              <a:t>7/8/2021</a:t>
             </a:fld>
             <a:endParaRPr lang="en-US"/>
           </a:p>
@@ -7944,8 +7944,8 @@
         </p:nvCxnSpPr>
         <p:spPr>
           <a:xfrm>
-            <a:off x="6079599" y="1202915"/>
-            <a:ext cx="3181487" cy="0"/>
+            <a:off x="6199023" y="1202915"/>
+            <a:ext cx="3062063" cy="0"/>
           </a:xfrm>
           <a:prstGeom prst="line">
             <a:avLst/>
@@ -8785,8 +8785,8 @@
         </p:nvSpPr>
         <p:spPr>
           <a:xfrm>
-            <a:off x="4566043" y="948999"/>
-            <a:ext cx="1513556" cy="507831"/>
+            <a:off x="4446619" y="948999"/>
+            <a:ext cx="1752404" cy="507831"/>
           </a:xfrm>
           <a:prstGeom prst="rect">
             <a:avLst/>
@@ -8807,7 +8807,7 @@
           </a:fontRef>
         </p:style>
         <p:txBody>
-          <a:bodyPr wrap="none" rtlCol="0">
+          <a:bodyPr wrap="square" rtlCol="0">
             <a:spAutoFit/>
           </a:bodyPr>
           <a:lstStyle/>
@@ -8822,7 +8822,7 @@
             <a:pPr algn="ctr"/>
             <a:r>
               <a:rPr lang="en-US" sz="1100" i="1" dirty="0"/>
-              <a:t>East-North Hemisphere</a:t>
+              <a:t>West Northern-Hemisphere</a:t>
             </a:r>
           </a:p>
         </p:txBody>
@@ -8844,8 +8844,8 @@
         </p:nvCxnSpPr>
         <p:spPr>
           <a:xfrm flipH="1">
-            <a:off x="5321691" y="1456830"/>
-            <a:ext cx="1130" cy="2975470"/>
+            <a:off x="5321693" y="1456830"/>
+            <a:ext cx="1128" cy="2975470"/>
           </a:xfrm>
           <a:prstGeom prst="line">
             <a:avLst/>
@@ -9569,7 +9569,7 @@
         <p:spPr>
           <a:xfrm>
             <a:off x="2647069" y="1202914"/>
-            <a:ext cx="1918974" cy="1"/>
+            <a:ext cx="1799550" cy="1"/>
           </a:xfrm>
           <a:prstGeom prst="line">
             <a:avLst/>

</xml_diff>

<commit_message>
Uploaded all the latest changes from last submission
</commit_message>
<xml_diff>
--- a/CodingWorkflow.pptx
+++ b/CodingWorkflow.pptx
@@ -244,7 +244,7 @@
           <a:p>
             <a:fld id="{9D97B504-67CE-45BE-ADD0-830AC3C59E05}" type="datetimeFigureOut">
               <a:rPr lang="en-US" smtClean="0"/>
-              <a:t>7/8/2021</a:t>
+              <a:t>5/22/2022</a:t>
             </a:fld>
             <a:endParaRPr lang="en-US"/>
           </a:p>
@@ -414,7 +414,7 @@
           <a:p>
             <a:fld id="{9D97B504-67CE-45BE-ADD0-830AC3C59E05}" type="datetimeFigureOut">
               <a:rPr lang="en-US" smtClean="0"/>
-              <a:t>7/8/2021</a:t>
+              <a:t>5/22/2022</a:t>
             </a:fld>
             <a:endParaRPr lang="en-US"/>
           </a:p>
@@ -594,7 +594,7 @@
           <a:p>
             <a:fld id="{9D97B504-67CE-45BE-ADD0-830AC3C59E05}" type="datetimeFigureOut">
               <a:rPr lang="en-US" smtClean="0"/>
-              <a:t>7/8/2021</a:t>
+              <a:t>5/22/2022</a:t>
             </a:fld>
             <a:endParaRPr lang="en-US"/>
           </a:p>
@@ -764,7 +764,7 @@
           <a:p>
             <a:fld id="{9D97B504-67CE-45BE-ADD0-830AC3C59E05}" type="datetimeFigureOut">
               <a:rPr lang="en-US" smtClean="0"/>
-              <a:t>7/8/2021</a:t>
+              <a:t>5/22/2022</a:t>
             </a:fld>
             <a:endParaRPr lang="en-US"/>
           </a:p>
@@ -1008,7 +1008,7 @@
           <a:p>
             <a:fld id="{9D97B504-67CE-45BE-ADD0-830AC3C59E05}" type="datetimeFigureOut">
               <a:rPr lang="en-US" smtClean="0"/>
-              <a:t>7/8/2021</a:t>
+              <a:t>5/22/2022</a:t>
             </a:fld>
             <a:endParaRPr lang="en-US"/>
           </a:p>
@@ -1240,7 +1240,7 @@
           <a:p>
             <a:fld id="{9D97B504-67CE-45BE-ADD0-830AC3C59E05}" type="datetimeFigureOut">
               <a:rPr lang="en-US" smtClean="0"/>
-              <a:t>7/8/2021</a:t>
+              <a:t>5/22/2022</a:t>
             </a:fld>
             <a:endParaRPr lang="en-US"/>
           </a:p>
@@ -1607,7 +1607,7 @@
           <a:p>
             <a:fld id="{9D97B504-67CE-45BE-ADD0-830AC3C59E05}" type="datetimeFigureOut">
               <a:rPr lang="en-US" smtClean="0"/>
-              <a:t>7/8/2021</a:t>
+              <a:t>5/22/2022</a:t>
             </a:fld>
             <a:endParaRPr lang="en-US"/>
           </a:p>
@@ -1725,7 +1725,7 @@
           <a:p>
             <a:fld id="{9D97B504-67CE-45BE-ADD0-830AC3C59E05}" type="datetimeFigureOut">
               <a:rPr lang="en-US" smtClean="0"/>
-              <a:t>7/8/2021</a:t>
+              <a:t>5/22/2022</a:t>
             </a:fld>
             <a:endParaRPr lang="en-US"/>
           </a:p>
@@ -1820,7 +1820,7 @@
           <a:p>
             <a:fld id="{9D97B504-67CE-45BE-ADD0-830AC3C59E05}" type="datetimeFigureOut">
               <a:rPr lang="en-US" smtClean="0"/>
-              <a:t>7/8/2021</a:t>
+              <a:t>5/22/2022</a:t>
             </a:fld>
             <a:endParaRPr lang="en-US"/>
           </a:p>
@@ -2097,7 +2097,7 @@
           <a:p>
             <a:fld id="{9D97B504-67CE-45BE-ADD0-830AC3C59E05}" type="datetimeFigureOut">
               <a:rPr lang="en-US" smtClean="0"/>
-              <a:t>7/8/2021</a:t>
+              <a:t>5/22/2022</a:t>
             </a:fld>
             <a:endParaRPr lang="en-US"/>
           </a:p>
@@ -2354,7 +2354,7 @@
           <a:p>
             <a:fld id="{9D97B504-67CE-45BE-ADD0-830AC3C59E05}" type="datetimeFigureOut">
               <a:rPr lang="en-US" smtClean="0"/>
-              <a:t>7/8/2021</a:t>
+              <a:t>5/22/2022</a:t>
             </a:fld>
             <a:endParaRPr lang="en-US"/>
           </a:p>
@@ -2567,7 +2567,7 @@
           <a:p>
             <a:fld id="{9D97B504-67CE-45BE-ADD0-830AC3C59E05}" type="datetimeFigureOut">
               <a:rPr lang="en-US" smtClean="0"/>
-              <a:t>7/8/2021</a:t>
+              <a:t>5/22/2022</a:t>
             </a:fld>
             <a:endParaRPr lang="en-US"/>
           </a:p>
@@ -8023,8 +8023,8 @@
         </p:nvSpPr>
         <p:spPr>
           <a:xfrm>
-            <a:off x="2040685" y="109100"/>
-            <a:ext cx="1212769" cy="584775"/>
+            <a:off x="2166168" y="109100"/>
+            <a:ext cx="961803" cy="584775"/>
           </a:xfrm>
           <a:prstGeom prst="rect">
             <a:avLst/>
@@ -8059,9 +8059,10 @@
           <a:p>
             <a:pPr algn="ctr"/>
             <a:r>
-              <a:rPr lang="en-US" sz="1400" i="1" dirty="0"/>
-              <a:t>WorldClim 2.0</a:t>
-            </a:r>
+              <a:rPr lang="en-US" sz="1400" i="1" dirty="0" err="1"/>
+              <a:t>ClimateNA</a:t>
+            </a:r>
+            <a:endParaRPr lang="en-US" sz="1400" i="1" dirty="0"/>
           </a:p>
         </p:txBody>
       </p:sp>
@@ -8651,8 +8652,8 @@
         </p:nvSpPr>
         <p:spPr>
           <a:xfrm>
-            <a:off x="2830160" y="2149211"/>
-            <a:ext cx="1492716" cy="507831"/>
+            <a:off x="2916529" y="2149211"/>
+            <a:ext cx="1319977" cy="507831"/>
           </a:xfrm>
           <a:prstGeom prst="rect">
             <a:avLst/>
@@ -8681,14 +8682,14 @@
             <a:pPr algn="ctr"/>
             <a:r>
               <a:rPr lang="en-US" sz="1600" dirty="0"/>
-              <a:t>2 Timeframes</a:t>
+              <a:t>1 Timeframes</a:t>
             </a:r>
           </a:p>
           <a:p>
             <a:pPr algn="ctr"/>
             <a:r>
               <a:rPr lang="en-US" sz="1100" i="1" dirty="0"/>
-              <a:t>2041-2060, 2081-2100</a:t>
+              <a:t>2081-2100</a:t>
             </a:r>
           </a:p>
         </p:txBody>
@@ -8822,7 +8823,7 @@
             <a:pPr algn="ctr"/>
             <a:r>
               <a:rPr lang="en-US" sz="1100" i="1" dirty="0"/>
-              <a:t>West Northern-Hemisphere</a:t>
+              <a:t>North America</a:t>
             </a:r>
           </a:p>
         </p:txBody>
@@ -10805,7 +10806,7 @@
             <a:pPr algn="ctr"/>
             <a:r>
               <a:rPr lang="en-US" sz="1100" i="1" dirty="0"/>
-              <a:t>Lowest AICc</a:t>
+              <a:t>Lowest CBI</a:t>
             </a:r>
           </a:p>
         </p:txBody>
@@ -11041,8 +11042,8 @@
         </p:nvSpPr>
         <p:spPr>
           <a:xfrm>
-            <a:off x="6403713" y="11540743"/>
-            <a:ext cx="2465740" cy="507831"/>
+            <a:off x="6555999" y="11540743"/>
+            <a:ext cx="2161168" cy="507831"/>
           </a:xfrm>
           <a:prstGeom prst="rect">
             <a:avLst/>
@@ -11078,7 +11079,7 @@
             <a:pPr algn="ctr"/>
             <a:r>
               <a:rPr lang="en-US" sz="1100" i="1" dirty="0"/>
-              <a:t>AUC, R2, TPR, TNR, Variable importance</a:t>
+              <a:t>AUC, R2, CBI, Variable importance</a:t>
             </a:r>
             <a:endParaRPr lang="en-US" sz="1600" i="1" dirty="0"/>
           </a:p>
@@ -11223,7 +11224,7 @@
             <a:pPr algn="ctr"/>
             <a:r>
               <a:rPr lang="en-US" sz="1100" i="1" dirty="0"/>
-              <a:t>6 climate models for each city</a:t>
+              <a:t>3 climate models for each city</a:t>
             </a:r>
             <a:endParaRPr lang="en-US" sz="1600" i="1" dirty="0"/>
           </a:p>

</xml_diff>